<commit_message>
second draft of readme and notebook narrative.
</commit_message>
<xml_diff>
--- a/assets/The Rise of Fake News in the Political.pptx
+++ b/assets/The Rise of Fake News in the Political.pptx
@@ -8,6 +8,10 @@
     <p:sldId id="256" r:id="rId2"/>
     <p:sldId id="257" r:id="rId3"/>
     <p:sldId id="258" r:id="rId4"/>
+    <p:sldId id="259" r:id="rId5"/>
+    <p:sldId id="262" r:id="rId6"/>
+    <p:sldId id="260" r:id="rId7"/>
+    <p:sldId id="261" r:id="rId8"/>
   </p:sldIdLst>
   <p:sldSz cx="12192000" cy="6858000"/>
   <p:notesSz cx="6858000" cy="9144000"/>
@@ -106,7 +110,285 @@
       </a:defRPr>
     </a:lvl9pPr>
   </p:defaultTextStyle>
+  <p:extLst>
+    <p:ext uri="{EFAFB233-063F-42B5-8137-9DF3F51BA10A}">
+      <p15:sldGuideLst xmlns:p15="http://schemas.microsoft.com/office/powerpoint/2012/main"/>
+    </p:ext>
+  </p:extLst>
 </p:presentation>
+</file>
+
+<file path=ppt/revisionInfo.xml><?xml version="1.0" encoding="utf-8"?>
+<p1510:revInfo xmlns:a="http://schemas.openxmlformats.org/drawingml/2006/main" xmlns:r="http://schemas.openxmlformats.org/officeDocument/2006/relationships" xmlns:p1510="http://schemas.microsoft.com/office/powerpoint/2015/10/main">
+  <p1510:revLst>
+    <p1510:client id="{BCF6624D-8897-4EE8-AD3C-FE9D7778F6D2}" v="1" dt="2021-02-11T07:22:54.365"/>
+  </p1510:revLst>
+</p1510:revInfo>
+</file>
+
+<file path=ppt/changesInfos/changesInfo1.xml><?xml version="1.0" encoding="utf-8"?>
+<pc:chgInfo xmlns:a="http://schemas.openxmlformats.org/drawingml/2006/main" xmlns:r="http://schemas.openxmlformats.org/officeDocument/2006/relationships" xmlns:ac="http://schemas.microsoft.com/office/drawing/2013/main/command" xmlns:pc="http://schemas.microsoft.com/office/powerpoint/2013/main/command">
+  <pc:docChgLst>
+    <pc:chgData name="Michael" userId="0df92e9667c24698" providerId="LiveId" clId="{BCF6624D-8897-4EE8-AD3C-FE9D7778F6D2}"/>
+    <pc:docChg chg="custSel addSld modSld">
+      <pc:chgData name="Michael" userId="0df92e9667c24698" providerId="LiveId" clId="{BCF6624D-8897-4EE8-AD3C-FE9D7778F6D2}" dt="2021-02-11T07:23:06.455" v="131" actId="26606"/>
+      <pc:docMkLst>
+        <pc:docMk/>
+      </pc:docMkLst>
+      <pc:sldChg chg="addSp delSp modSp mod setBg">
+        <pc:chgData name="Michael" userId="0df92e9667c24698" providerId="LiveId" clId="{BCF6624D-8897-4EE8-AD3C-FE9D7778F6D2}" dt="2021-02-11T07:21:54.453" v="128" actId="26606"/>
+        <pc:sldMkLst>
+          <pc:docMk/>
+          <pc:sldMk cId="2114640038" sldId="257"/>
+        </pc:sldMkLst>
+        <pc:spChg chg="mod">
+          <ac:chgData name="Michael" userId="0df92e9667c24698" providerId="LiveId" clId="{BCF6624D-8897-4EE8-AD3C-FE9D7778F6D2}" dt="2021-02-11T07:21:54.453" v="128" actId="26606"/>
+          <ac:spMkLst>
+            <pc:docMk/>
+            <pc:sldMk cId="2114640038" sldId="257"/>
+            <ac:spMk id="2" creationId="{7C079471-9259-4468-A38F-349E78CBC85F}"/>
+          </ac:spMkLst>
+        </pc:spChg>
+        <pc:spChg chg="del">
+          <ac:chgData name="Michael" userId="0df92e9667c24698" providerId="LiveId" clId="{BCF6624D-8897-4EE8-AD3C-FE9D7778F6D2}" dt="2021-02-11T07:21:42.715" v="126" actId="26606"/>
+          <ac:spMkLst>
+            <pc:docMk/>
+            <pc:sldMk cId="2114640038" sldId="257"/>
+            <ac:spMk id="3" creationId="{8ED5D513-BC70-4E4E-8979-11B9CDBC4CE3}"/>
+          </ac:spMkLst>
+        </pc:spChg>
+        <pc:spChg chg="add del">
+          <ac:chgData name="Michael" userId="0df92e9667c24698" providerId="LiveId" clId="{BCF6624D-8897-4EE8-AD3C-FE9D7778F6D2}" dt="2021-02-11T07:21:54.453" v="128" actId="26606"/>
+          <ac:spMkLst>
+            <pc:docMk/>
+            <pc:sldMk cId="2114640038" sldId="257"/>
+            <ac:spMk id="9" creationId="{DA381740-063A-41A4-836D-85D14980EEF0}"/>
+          </ac:spMkLst>
+        </pc:spChg>
+        <pc:spChg chg="add del">
+          <ac:chgData name="Michael" userId="0df92e9667c24698" providerId="LiveId" clId="{BCF6624D-8897-4EE8-AD3C-FE9D7778F6D2}" dt="2021-02-11T07:21:54.453" v="128" actId="26606"/>
+          <ac:spMkLst>
+            <pc:docMk/>
+            <pc:sldMk cId="2114640038" sldId="257"/>
+            <ac:spMk id="11" creationId="{D2306AB6-9D65-4F8E-9FD7-C3F3A3DE395D}"/>
+          </ac:spMkLst>
+        </pc:spChg>
+        <pc:spChg chg="add del">
+          <ac:chgData name="Michael" userId="0df92e9667c24698" providerId="LiveId" clId="{BCF6624D-8897-4EE8-AD3C-FE9D7778F6D2}" dt="2021-02-11T07:21:54.453" v="128" actId="26606"/>
+          <ac:spMkLst>
+            <pc:docMk/>
+            <pc:sldMk cId="2114640038" sldId="257"/>
+            <ac:spMk id="13" creationId="{284C940E-7A1D-418E-A9E8-C9852CA8EE57}"/>
+          </ac:spMkLst>
+        </pc:spChg>
+        <pc:spChg chg="add del">
+          <ac:chgData name="Michael" userId="0df92e9667c24698" providerId="LiveId" clId="{BCF6624D-8897-4EE8-AD3C-FE9D7778F6D2}" dt="2021-02-11T07:21:54.453" v="128" actId="26606"/>
+          <ac:spMkLst>
+            <pc:docMk/>
+            <pc:sldMk cId="2114640038" sldId="257"/>
+            <ac:spMk id="15" creationId="{72E0F698-EDF5-464C-B466-8D34B8AF17C7}"/>
+          </ac:spMkLst>
+        </pc:spChg>
+        <pc:spChg chg="add">
+          <ac:chgData name="Michael" userId="0df92e9667c24698" providerId="LiveId" clId="{BCF6624D-8897-4EE8-AD3C-FE9D7778F6D2}" dt="2021-02-11T07:21:54.453" v="128" actId="26606"/>
+          <ac:spMkLst>
+            <pc:docMk/>
+            <pc:sldMk cId="2114640038" sldId="257"/>
+            <ac:spMk id="20" creationId="{DA381740-063A-41A4-836D-85D14980EEF0}"/>
+          </ac:spMkLst>
+        </pc:spChg>
+        <pc:spChg chg="add">
+          <ac:chgData name="Michael" userId="0df92e9667c24698" providerId="LiveId" clId="{BCF6624D-8897-4EE8-AD3C-FE9D7778F6D2}" dt="2021-02-11T07:21:54.453" v="128" actId="26606"/>
+          <ac:spMkLst>
+            <pc:docMk/>
+            <pc:sldMk cId="2114640038" sldId="257"/>
+            <ac:spMk id="22" creationId="{168AB93A-48BC-4C25-A3AD-C17B5A682A94}"/>
+          </ac:spMkLst>
+        </pc:spChg>
+        <pc:spChg chg="add">
+          <ac:chgData name="Michael" userId="0df92e9667c24698" providerId="LiveId" clId="{BCF6624D-8897-4EE8-AD3C-FE9D7778F6D2}" dt="2021-02-11T07:21:54.453" v="128" actId="26606"/>
+          <ac:spMkLst>
+            <pc:docMk/>
+            <pc:sldMk cId="2114640038" sldId="257"/>
+            <ac:spMk id="24" creationId="{3FCFB1DE-0B7E-48CC-BA90-B2AB0889F9D6}"/>
+          </ac:spMkLst>
+        </pc:spChg>
+        <pc:picChg chg="add mod ord">
+          <ac:chgData name="Michael" userId="0df92e9667c24698" providerId="LiveId" clId="{BCF6624D-8897-4EE8-AD3C-FE9D7778F6D2}" dt="2021-02-11T07:21:54.453" v="128" actId="26606"/>
+          <ac:picMkLst>
+            <pc:docMk/>
+            <pc:sldMk cId="2114640038" sldId="257"/>
+            <ac:picMk id="5" creationId="{BA893595-DFD6-44FF-93FB-3185B787EDC4}"/>
+          </ac:picMkLst>
+        </pc:picChg>
+      </pc:sldChg>
+      <pc:sldChg chg="addSp modSp new mod setBg">
+        <pc:chgData name="Michael" userId="0df92e9667c24698" providerId="LiveId" clId="{BCF6624D-8897-4EE8-AD3C-FE9D7778F6D2}" dt="2021-02-11T07:20:16.445" v="124" actId="26606"/>
+        <pc:sldMkLst>
+          <pc:docMk/>
+          <pc:sldMk cId="2674961052" sldId="259"/>
+        </pc:sldMkLst>
+        <pc:spChg chg="mod">
+          <ac:chgData name="Michael" userId="0df92e9667c24698" providerId="LiveId" clId="{BCF6624D-8897-4EE8-AD3C-FE9D7778F6D2}" dt="2021-02-11T07:20:16.445" v="124" actId="26606"/>
+          <ac:spMkLst>
+            <pc:docMk/>
+            <pc:sldMk cId="2674961052" sldId="259"/>
+            <ac:spMk id="2" creationId="{493E4F06-8A4F-4241-8E34-E41DF7795EF5}"/>
+          </ac:spMkLst>
+        </pc:spChg>
+        <pc:spChg chg="mod">
+          <ac:chgData name="Michael" userId="0df92e9667c24698" providerId="LiveId" clId="{BCF6624D-8897-4EE8-AD3C-FE9D7778F6D2}" dt="2021-02-11T07:20:16.445" v="124" actId="26606"/>
+          <ac:spMkLst>
+            <pc:docMk/>
+            <pc:sldMk cId="2674961052" sldId="259"/>
+            <ac:spMk id="3" creationId="{D4447A6D-6A7E-49F9-9FD9-7C16E6D15218}"/>
+          </ac:spMkLst>
+        </pc:spChg>
+        <pc:spChg chg="add">
+          <ac:chgData name="Michael" userId="0df92e9667c24698" providerId="LiveId" clId="{BCF6624D-8897-4EE8-AD3C-FE9D7778F6D2}" dt="2021-02-11T07:20:16.445" v="124" actId="26606"/>
+          <ac:spMkLst>
+            <pc:docMk/>
+            <pc:sldMk cId="2674961052" sldId="259"/>
+            <ac:spMk id="9" creationId="{2C61293E-6EBE-43EF-A52C-9BEBFD7679D4}"/>
+          </ac:spMkLst>
+        </pc:spChg>
+        <pc:spChg chg="add">
+          <ac:chgData name="Michael" userId="0df92e9667c24698" providerId="LiveId" clId="{BCF6624D-8897-4EE8-AD3C-FE9D7778F6D2}" dt="2021-02-11T07:20:16.445" v="124" actId="26606"/>
+          <ac:spMkLst>
+            <pc:docMk/>
+            <pc:sldMk cId="2674961052" sldId="259"/>
+            <ac:spMk id="11" creationId="{3FCFB1DE-0B7E-48CC-BA90-B2AB0889F9D6}"/>
+          </ac:spMkLst>
+        </pc:spChg>
+        <pc:picChg chg="add">
+          <ac:chgData name="Michael" userId="0df92e9667c24698" providerId="LiveId" clId="{BCF6624D-8897-4EE8-AD3C-FE9D7778F6D2}" dt="2021-02-11T07:20:16.445" v="124" actId="26606"/>
+          <ac:picMkLst>
+            <pc:docMk/>
+            <pc:sldMk cId="2674961052" sldId="259"/>
+            <ac:picMk id="5" creationId="{38B9E1BA-3FB8-4604-B68C-432B088ACC79}"/>
+          </ac:picMkLst>
+        </pc:picChg>
+      </pc:sldChg>
+      <pc:sldChg chg="addSp modSp new mod setBg">
+        <pc:chgData name="Michael" userId="0df92e9667c24698" providerId="LiveId" clId="{BCF6624D-8897-4EE8-AD3C-FE9D7778F6D2}" dt="2021-02-11T07:20:45.044" v="125" actId="26606"/>
+        <pc:sldMkLst>
+          <pc:docMk/>
+          <pc:sldMk cId="1605746849" sldId="260"/>
+        </pc:sldMkLst>
+        <pc:spChg chg="mod">
+          <ac:chgData name="Michael" userId="0df92e9667c24698" providerId="LiveId" clId="{BCF6624D-8897-4EE8-AD3C-FE9D7778F6D2}" dt="2021-02-11T07:20:45.044" v="125" actId="26606"/>
+          <ac:spMkLst>
+            <pc:docMk/>
+            <pc:sldMk cId="1605746849" sldId="260"/>
+            <ac:spMk id="2" creationId="{71E54A4C-27C8-425E-8D48-B9444171A947}"/>
+          </ac:spMkLst>
+        </pc:spChg>
+        <pc:spChg chg="mod">
+          <ac:chgData name="Michael" userId="0df92e9667c24698" providerId="LiveId" clId="{BCF6624D-8897-4EE8-AD3C-FE9D7778F6D2}" dt="2021-02-11T07:20:45.044" v="125" actId="26606"/>
+          <ac:spMkLst>
+            <pc:docMk/>
+            <pc:sldMk cId="1605746849" sldId="260"/>
+            <ac:spMk id="3" creationId="{EF8B6F65-2A6F-42C3-B8D8-31896C394E47}"/>
+          </ac:spMkLst>
+        </pc:spChg>
+        <pc:spChg chg="add">
+          <ac:chgData name="Michael" userId="0df92e9667c24698" providerId="LiveId" clId="{BCF6624D-8897-4EE8-AD3C-FE9D7778F6D2}" dt="2021-02-11T07:20:45.044" v="125" actId="26606"/>
+          <ac:spMkLst>
+            <pc:docMk/>
+            <pc:sldMk cId="1605746849" sldId="260"/>
+            <ac:spMk id="9" creationId="{2C61293E-6EBE-43EF-A52C-9BEBFD7679D4}"/>
+          </ac:spMkLst>
+        </pc:spChg>
+        <pc:spChg chg="add">
+          <ac:chgData name="Michael" userId="0df92e9667c24698" providerId="LiveId" clId="{BCF6624D-8897-4EE8-AD3C-FE9D7778F6D2}" dt="2021-02-11T07:20:45.044" v="125" actId="26606"/>
+          <ac:spMkLst>
+            <pc:docMk/>
+            <pc:sldMk cId="1605746849" sldId="260"/>
+            <ac:spMk id="11" creationId="{3FCFB1DE-0B7E-48CC-BA90-B2AB0889F9D6}"/>
+          </ac:spMkLst>
+        </pc:spChg>
+        <pc:picChg chg="add">
+          <ac:chgData name="Michael" userId="0df92e9667c24698" providerId="LiveId" clId="{BCF6624D-8897-4EE8-AD3C-FE9D7778F6D2}" dt="2021-02-11T07:20:45.044" v="125" actId="26606"/>
+          <ac:picMkLst>
+            <pc:docMk/>
+            <pc:sldMk cId="1605746849" sldId="260"/>
+            <ac:picMk id="5" creationId="{2E3BBD6E-E0FA-434A-8C9A-A141AA369CA9}"/>
+          </ac:picMkLst>
+        </pc:picChg>
+      </pc:sldChg>
+      <pc:sldChg chg="modSp new mod">
+        <pc:chgData name="Michael" userId="0df92e9667c24698" providerId="LiveId" clId="{BCF6624D-8897-4EE8-AD3C-FE9D7778F6D2}" dt="2021-02-11T06:08:20.780" v="101" actId="20577"/>
+        <pc:sldMkLst>
+          <pc:docMk/>
+          <pc:sldMk cId="3302558011" sldId="261"/>
+        </pc:sldMkLst>
+        <pc:spChg chg="mod">
+          <ac:chgData name="Michael" userId="0df92e9667c24698" providerId="LiveId" clId="{BCF6624D-8897-4EE8-AD3C-FE9D7778F6D2}" dt="2021-02-11T06:08:20.780" v="101" actId="20577"/>
+          <ac:spMkLst>
+            <pc:docMk/>
+            <pc:sldMk cId="3302558011" sldId="261"/>
+            <ac:spMk id="2" creationId="{540CDC84-4EE6-4E14-90C4-56266BC3456A}"/>
+          </ac:spMkLst>
+        </pc:spChg>
+      </pc:sldChg>
+      <pc:sldChg chg="addSp delSp modSp new mod setBg">
+        <pc:chgData name="Michael" userId="0df92e9667c24698" providerId="LiveId" clId="{BCF6624D-8897-4EE8-AD3C-FE9D7778F6D2}" dt="2021-02-11T07:23:06.455" v="131" actId="26606"/>
+        <pc:sldMkLst>
+          <pc:docMk/>
+          <pc:sldMk cId="1859402302" sldId="262"/>
+        </pc:sldMkLst>
+        <pc:spChg chg="mod">
+          <ac:chgData name="Michael" userId="0df92e9667c24698" providerId="LiveId" clId="{BCF6624D-8897-4EE8-AD3C-FE9D7778F6D2}" dt="2021-02-11T07:23:06.455" v="131" actId="26606"/>
+          <ac:spMkLst>
+            <pc:docMk/>
+            <pc:sldMk cId="1859402302" sldId="262"/>
+            <ac:spMk id="2" creationId="{146D8000-12F0-41F9-BB17-FCA9930209F1}"/>
+          </ac:spMkLst>
+        </pc:spChg>
+        <pc:spChg chg="del">
+          <ac:chgData name="Michael" userId="0df92e9667c24698" providerId="LiveId" clId="{BCF6624D-8897-4EE8-AD3C-FE9D7778F6D2}" dt="2021-02-11T07:22:54.364" v="129" actId="931"/>
+          <ac:spMkLst>
+            <pc:docMk/>
+            <pc:sldMk cId="1859402302" sldId="262"/>
+            <ac:spMk id="3" creationId="{91685C2C-44D0-4085-9BDE-0A0D4EAF1D35}"/>
+          </ac:spMkLst>
+        </pc:spChg>
+        <pc:spChg chg="add">
+          <ac:chgData name="Michael" userId="0df92e9667c24698" providerId="LiveId" clId="{BCF6624D-8897-4EE8-AD3C-FE9D7778F6D2}" dt="2021-02-11T07:23:06.455" v="131" actId="26606"/>
+          <ac:spMkLst>
+            <pc:docMk/>
+            <pc:sldMk cId="1859402302" sldId="262"/>
+            <ac:spMk id="9" creationId="{F30D4082-C655-4F88-A4C2-7C0536FA074E}"/>
+          </ac:spMkLst>
+        </pc:spChg>
+        <pc:spChg chg="add">
+          <ac:chgData name="Michael" userId="0df92e9667c24698" providerId="LiveId" clId="{BCF6624D-8897-4EE8-AD3C-FE9D7778F6D2}" dt="2021-02-11T07:23:06.455" v="131" actId="26606"/>
+          <ac:spMkLst>
+            <pc:docMk/>
+            <pc:sldMk cId="1859402302" sldId="262"/>
+            <ac:spMk id="12" creationId="{F13C74B1-5B17-4795-BED0-7140497B445A}"/>
+          </ac:spMkLst>
+        </pc:spChg>
+        <pc:spChg chg="add">
+          <ac:chgData name="Michael" userId="0df92e9667c24698" providerId="LiveId" clId="{BCF6624D-8897-4EE8-AD3C-FE9D7778F6D2}" dt="2021-02-11T07:23:06.455" v="131" actId="26606"/>
+          <ac:spMkLst>
+            <pc:docMk/>
+            <pc:sldMk cId="1859402302" sldId="262"/>
+            <ac:spMk id="14" creationId="{3FCFB1DE-0B7E-48CC-BA90-B2AB0889F9D6}"/>
+          </ac:spMkLst>
+        </pc:spChg>
+        <pc:picChg chg="add mod">
+          <ac:chgData name="Michael" userId="0df92e9667c24698" providerId="LiveId" clId="{BCF6624D-8897-4EE8-AD3C-FE9D7778F6D2}" dt="2021-02-11T07:23:06.455" v="131" actId="26606"/>
+          <ac:picMkLst>
+            <pc:docMk/>
+            <pc:sldMk cId="1859402302" sldId="262"/>
+            <ac:picMk id="5" creationId="{6ED14EC7-9708-4199-8AE8-2B4C8A004ACC}"/>
+          </ac:picMkLst>
+        </pc:picChg>
+      </pc:sldChg>
+    </pc:docChg>
+  </pc:docChgLst>
+</pc:chgInfo>
 </file>
 
 <file path=ppt/slideLayouts/slideLayout1.xml><?xml version="1.0" encoding="utf-8"?>
@@ -597,7 +879,7 @@
           <a:p>
             <a:fld id="{72345051-2045-45DA-935E-2E3CA1A69ADC}" type="datetimeFigureOut">
               <a:rPr lang="en-US" smtClean="0"/>
-              <a:t>2/9/2021</a:t>
+              <a:t>2/10/2021</a:t>
             </a:fld>
             <a:endParaRPr lang="en-US" dirty="0"/>
           </a:p>
@@ -795,7 +1077,7 @@
           <a:p>
             <a:fld id="{72345051-2045-45DA-935E-2E3CA1A69ADC}" type="datetimeFigureOut">
               <a:rPr lang="en-US" smtClean="0"/>
-              <a:t>2/9/2021</a:t>
+              <a:t>2/10/2021</a:t>
             </a:fld>
             <a:endParaRPr lang="en-US"/>
           </a:p>
@@ -1003,7 +1285,7 @@
           <a:p>
             <a:fld id="{72345051-2045-45DA-935E-2E3CA1A69ADC}" type="datetimeFigureOut">
               <a:rPr lang="en-US" smtClean="0"/>
-              <a:t>2/9/2021</a:t>
+              <a:t>2/10/2021</a:t>
             </a:fld>
             <a:endParaRPr lang="en-US"/>
           </a:p>
@@ -1225,7 +1507,7 @@
           <a:p>
             <a:fld id="{72345051-2045-45DA-935E-2E3CA1A69ADC}" type="datetimeFigureOut">
               <a:rPr lang="en-US" smtClean="0"/>
-              <a:t>2/9/2021</a:t>
+              <a:t>2/10/2021</a:t>
             </a:fld>
             <a:endParaRPr lang="en-US"/>
           </a:p>
@@ -2136,7 +2418,7 @@
           <a:p>
             <a:fld id="{72345051-2045-45DA-935E-2E3CA1A69ADC}" type="datetimeFigureOut">
               <a:rPr lang="en-US" smtClean="0"/>
-              <a:t>2/9/2021</a:t>
+              <a:t>2/10/2021</a:t>
             </a:fld>
             <a:endParaRPr lang="en-US"/>
           </a:p>
@@ -2739,7 +3021,7 @@
           <a:p>
             <a:fld id="{72345051-2045-45DA-935E-2E3CA1A69ADC}" type="datetimeFigureOut">
               <a:rPr lang="en-US" smtClean="0"/>
-              <a:t>2/9/2021</a:t>
+              <a:t>2/10/2021</a:t>
             </a:fld>
             <a:endParaRPr lang="en-US"/>
           </a:p>
@@ -3787,7 +4069,7 @@
           <a:p>
             <a:fld id="{72345051-2045-45DA-935E-2E3CA1A69ADC}" type="datetimeFigureOut">
               <a:rPr lang="en-US" smtClean="0"/>
-              <a:t>2/9/2021</a:t>
+              <a:t>2/10/2021</a:t>
             </a:fld>
             <a:endParaRPr lang="en-US"/>
           </a:p>
@@ -4571,7 +4853,7 @@
           <a:p>
             <a:fld id="{72345051-2045-45DA-935E-2E3CA1A69ADC}" type="datetimeFigureOut">
               <a:rPr lang="en-US" smtClean="0"/>
-              <a:t>2/9/2021</a:t>
+              <a:t>2/10/2021</a:t>
             </a:fld>
             <a:endParaRPr lang="en-US"/>
           </a:p>
@@ -5020,7 +5302,7 @@
           <a:p>
             <a:fld id="{72345051-2045-45DA-935E-2E3CA1A69ADC}" type="datetimeFigureOut">
               <a:rPr lang="en-US" smtClean="0"/>
-              <a:t>2/9/2021</a:t>
+              <a:t>2/10/2021</a:t>
             </a:fld>
             <a:endParaRPr lang="en-US"/>
           </a:p>
@@ -5337,7 +5619,7 @@
           <a:p>
             <a:fld id="{72345051-2045-45DA-935E-2E3CA1A69ADC}" type="datetimeFigureOut">
               <a:rPr lang="en-US" smtClean="0"/>
-              <a:t>2/9/2021</a:t>
+              <a:t>2/10/2021</a:t>
             </a:fld>
             <a:endParaRPr lang="en-US"/>
           </a:p>
@@ -5965,7 +6247,7 @@
           <a:p>
             <a:fld id="{72345051-2045-45DA-935E-2E3CA1A69ADC}" type="datetimeFigureOut">
               <a:rPr lang="en-US" smtClean="0"/>
-              <a:t>2/9/2021</a:t>
+              <a:t>2/10/2021</a:t>
             </a:fld>
             <a:endParaRPr lang="en-US"/>
           </a:p>
@@ -6538,7 +6820,7 @@
           <a:p>
             <a:fld id="{72345051-2045-45DA-935E-2E3CA1A69ADC}" type="datetimeFigureOut">
               <a:rPr lang="en-US" smtClean="0"/>
-              <a:t>2/9/2021</a:t>
+              <a:t>2/10/2021</a:t>
             </a:fld>
             <a:endParaRPr lang="en-US" dirty="0"/>
           </a:p>
@@ -7489,6 +7771,14 @@
 <file path=ppt/slides/slide2.xml><?xml version="1.0" encoding="utf-8"?>
 <p:sld xmlns:a="http://schemas.openxmlformats.org/drawingml/2006/main" xmlns:r="http://schemas.openxmlformats.org/officeDocument/2006/relationships" xmlns:p="http://schemas.openxmlformats.org/presentationml/2006/main">
   <p:cSld>
+    <p:bg>
+      <p:bgPr>
+        <a:solidFill>
+          <a:schemeClr val="bg1"/>
+        </a:solidFill>
+        <a:effectLst/>
+      </p:bgPr>
+    </p:bg>
     <p:spTree>
       <p:nvGrpSpPr>
         <p:cNvPr id="1" name=""/>
@@ -7505,6 +7795,413 @@
       </p:grpSpPr>
       <p:sp>
         <p:nvSpPr>
+          <p:cNvPr id="20" name="Rectangle 6">
+            <a:extLst>
+              <a:ext uri="{FF2B5EF4-FFF2-40B4-BE49-F238E27FC236}">
+                <a16:creationId xmlns:a16="http://schemas.microsoft.com/office/drawing/2014/main" id="{DA381740-063A-41A4-836D-85D14980EEF0}"/>
+              </a:ext>
+              <a:ext uri="{C183D7F6-B498-43B3-948B-1728B52AA6E4}">
+                <adec:decorative xmlns:adec="http://schemas.microsoft.com/office/drawing/2017/decorative" val="1"/>
+              </a:ext>
+            </a:extLst>
+          </p:cNvPr>
+          <p:cNvSpPr>
+            <a:spLocks noGrp="1" noRot="1" noChangeAspect="1" noMove="1" noResize="1" noEditPoints="1" noAdjustHandles="1" noChangeArrowheads="1" noChangeShapeType="1" noTextEdit="1"/>
+          </p:cNvSpPr>
+          <p:nvPr>
+            <p:extLst>
+              <p:ext uri="{386F3935-93C4-4BCD-93E2-E3B085C9AB24}">
+                <p16:designElem xmlns:p16="http://schemas.microsoft.com/office/powerpoint/2015/main" val="1"/>
+              </p:ext>
+            </p:extLst>
+          </p:nvPr>
+        </p:nvSpPr>
+        <p:spPr>
+          <a:xfrm>
+            <a:off x="838200" y="4736883"/>
+            <a:ext cx="4243589" cy="27432"/>
+          </a:xfrm>
+          <a:custGeom>
+            <a:avLst/>
+            <a:gdLst>
+              <a:gd name="connsiteX0" fmla="*/ 0 w 4243589"/>
+              <a:gd name="connsiteY0" fmla="*/ 0 h 27432"/>
+              <a:gd name="connsiteX1" fmla="*/ 563791 w 4243589"/>
+              <a:gd name="connsiteY1" fmla="*/ 0 h 27432"/>
+              <a:gd name="connsiteX2" fmla="*/ 1042710 w 4243589"/>
+              <a:gd name="connsiteY2" fmla="*/ 0 h 27432"/>
+              <a:gd name="connsiteX3" fmla="*/ 1564066 w 4243589"/>
+              <a:gd name="connsiteY3" fmla="*/ 0 h 27432"/>
+              <a:gd name="connsiteX4" fmla="*/ 2212729 w 4243589"/>
+              <a:gd name="connsiteY4" fmla="*/ 0 h 27432"/>
+              <a:gd name="connsiteX5" fmla="*/ 2776520 w 4243589"/>
+              <a:gd name="connsiteY5" fmla="*/ 0 h 27432"/>
+              <a:gd name="connsiteX6" fmla="*/ 3297875 w 4243589"/>
+              <a:gd name="connsiteY6" fmla="*/ 0 h 27432"/>
+              <a:gd name="connsiteX7" fmla="*/ 4243589 w 4243589"/>
+              <a:gd name="connsiteY7" fmla="*/ 0 h 27432"/>
+              <a:gd name="connsiteX8" fmla="*/ 4243589 w 4243589"/>
+              <a:gd name="connsiteY8" fmla="*/ 27432 h 27432"/>
+              <a:gd name="connsiteX9" fmla="*/ 3637362 w 4243589"/>
+              <a:gd name="connsiteY9" fmla="*/ 27432 h 27432"/>
+              <a:gd name="connsiteX10" fmla="*/ 3116007 w 4243589"/>
+              <a:gd name="connsiteY10" fmla="*/ 27432 h 27432"/>
+              <a:gd name="connsiteX11" fmla="*/ 2424908 w 4243589"/>
+              <a:gd name="connsiteY11" fmla="*/ 27432 h 27432"/>
+              <a:gd name="connsiteX12" fmla="*/ 1861117 w 4243589"/>
+              <a:gd name="connsiteY12" fmla="*/ 27432 h 27432"/>
+              <a:gd name="connsiteX13" fmla="*/ 1382198 w 4243589"/>
+              <a:gd name="connsiteY13" fmla="*/ 27432 h 27432"/>
+              <a:gd name="connsiteX14" fmla="*/ 733535 w 4243589"/>
+              <a:gd name="connsiteY14" fmla="*/ 27432 h 27432"/>
+              <a:gd name="connsiteX15" fmla="*/ 0 w 4243589"/>
+              <a:gd name="connsiteY15" fmla="*/ 27432 h 27432"/>
+              <a:gd name="connsiteX16" fmla="*/ 0 w 4243589"/>
+              <a:gd name="connsiteY16" fmla="*/ 0 h 27432"/>
+            </a:gdLst>
+            <a:ahLst/>
+            <a:cxnLst>
+              <a:cxn ang="0">
+                <a:pos x="connsiteX0" y="connsiteY0"/>
+              </a:cxn>
+              <a:cxn ang="0">
+                <a:pos x="connsiteX1" y="connsiteY1"/>
+              </a:cxn>
+              <a:cxn ang="0">
+                <a:pos x="connsiteX2" y="connsiteY2"/>
+              </a:cxn>
+              <a:cxn ang="0">
+                <a:pos x="connsiteX3" y="connsiteY3"/>
+              </a:cxn>
+              <a:cxn ang="0">
+                <a:pos x="connsiteX4" y="connsiteY4"/>
+              </a:cxn>
+              <a:cxn ang="0">
+                <a:pos x="connsiteX5" y="connsiteY5"/>
+              </a:cxn>
+              <a:cxn ang="0">
+                <a:pos x="connsiteX6" y="connsiteY6"/>
+              </a:cxn>
+              <a:cxn ang="0">
+                <a:pos x="connsiteX7" y="connsiteY7"/>
+              </a:cxn>
+              <a:cxn ang="0">
+                <a:pos x="connsiteX8" y="connsiteY8"/>
+              </a:cxn>
+              <a:cxn ang="0">
+                <a:pos x="connsiteX9" y="connsiteY9"/>
+              </a:cxn>
+              <a:cxn ang="0">
+                <a:pos x="connsiteX10" y="connsiteY10"/>
+              </a:cxn>
+              <a:cxn ang="0">
+                <a:pos x="connsiteX11" y="connsiteY11"/>
+              </a:cxn>
+              <a:cxn ang="0">
+                <a:pos x="connsiteX12" y="connsiteY12"/>
+              </a:cxn>
+              <a:cxn ang="0">
+                <a:pos x="connsiteX13" y="connsiteY13"/>
+              </a:cxn>
+              <a:cxn ang="0">
+                <a:pos x="connsiteX14" y="connsiteY14"/>
+              </a:cxn>
+              <a:cxn ang="0">
+                <a:pos x="connsiteX15" y="connsiteY15"/>
+              </a:cxn>
+              <a:cxn ang="0">
+                <a:pos x="connsiteX16" y="connsiteY16"/>
+              </a:cxn>
+            </a:cxnLst>
+            <a:rect l="l" t="t" r="r" b="b"/>
+            <a:pathLst>
+              <a:path w="4243589" h="27432" fill="none" extrusionOk="0">
+                <a:moveTo>
+                  <a:pt x="0" y="0"/>
+                </a:moveTo>
+                <a:cubicBezTo>
+                  <a:pt x="157351" y="-15653"/>
+                  <a:pt x="378877" y="-5828"/>
+                  <a:pt x="563791" y="0"/>
+                </a:cubicBezTo>
+                <a:cubicBezTo>
+                  <a:pt x="748705" y="5828"/>
+                  <a:pt x="905659" y="-5525"/>
+                  <a:pt x="1042710" y="0"/>
+                </a:cubicBezTo>
+                <a:cubicBezTo>
+                  <a:pt x="1179761" y="5525"/>
+                  <a:pt x="1356845" y="-21288"/>
+                  <a:pt x="1564066" y="0"/>
+                </a:cubicBezTo>
+                <a:cubicBezTo>
+                  <a:pt x="1771287" y="21288"/>
+                  <a:pt x="1912099" y="25135"/>
+                  <a:pt x="2212729" y="0"/>
+                </a:cubicBezTo>
+                <a:cubicBezTo>
+                  <a:pt x="2513359" y="-25135"/>
+                  <a:pt x="2514918" y="-27119"/>
+                  <a:pt x="2776520" y="0"/>
+                </a:cubicBezTo>
+                <a:cubicBezTo>
+                  <a:pt x="3038122" y="27119"/>
+                  <a:pt x="3178771" y="18116"/>
+                  <a:pt x="3297875" y="0"/>
+                </a:cubicBezTo>
+                <a:cubicBezTo>
+                  <a:pt x="3416980" y="-18116"/>
+                  <a:pt x="4012240" y="-40869"/>
+                  <a:pt x="4243589" y="0"/>
+                </a:cubicBezTo>
+                <a:cubicBezTo>
+                  <a:pt x="4242616" y="8304"/>
+                  <a:pt x="4243111" y="21512"/>
+                  <a:pt x="4243589" y="27432"/>
+                </a:cubicBezTo>
+                <a:cubicBezTo>
+                  <a:pt x="4112949" y="6289"/>
+                  <a:pt x="3928037" y="10975"/>
+                  <a:pt x="3637362" y="27432"/>
+                </a:cubicBezTo>
+                <a:cubicBezTo>
+                  <a:pt x="3346687" y="43889"/>
+                  <a:pt x="3254446" y="35813"/>
+                  <a:pt x="3116007" y="27432"/>
+                </a:cubicBezTo>
+                <a:cubicBezTo>
+                  <a:pt x="2977569" y="19051"/>
+                  <a:pt x="2620228" y="38017"/>
+                  <a:pt x="2424908" y="27432"/>
+                </a:cubicBezTo>
+                <a:cubicBezTo>
+                  <a:pt x="2229588" y="16847"/>
+                  <a:pt x="2088287" y="5290"/>
+                  <a:pt x="1861117" y="27432"/>
+                </a:cubicBezTo>
+                <a:cubicBezTo>
+                  <a:pt x="1633947" y="49574"/>
+                  <a:pt x="1502447" y="8273"/>
+                  <a:pt x="1382198" y="27432"/>
+                </a:cubicBezTo>
+                <a:cubicBezTo>
+                  <a:pt x="1261949" y="46591"/>
+                  <a:pt x="1045440" y="37497"/>
+                  <a:pt x="733535" y="27432"/>
+                </a:cubicBezTo>
+                <a:cubicBezTo>
+                  <a:pt x="421630" y="17367"/>
+                  <a:pt x="341257" y="-9215"/>
+                  <a:pt x="0" y="27432"/>
+                </a:cubicBezTo>
+                <a:cubicBezTo>
+                  <a:pt x="-1048" y="14992"/>
+                  <a:pt x="-1120" y="7447"/>
+                  <a:pt x="0" y="0"/>
+                </a:cubicBezTo>
+                <a:close/>
+              </a:path>
+              <a:path w="4243589" h="27432" stroke="0" extrusionOk="0">
+                <a:moveTo>
+                  <a:pt x="0" y="0"/>
+                </a:moveTo>
+                <a:cubicBezTo>
+                  <a:pt x="128164" y="17204"/>
+                  <a:pt x="312653" y="1129"/>
+                  <a:pt x="563791" y="0"/>
+                </a:cubicBezTo>
+                <a:cubicBezTo>
+                  <a:pt x="814929" y="-1129"/>
+                  <a:pt x="837271" y="8503"/>
+                  <a:pt x="1042710" y="0"/>
+                </a:cubicBezTo>
+                <a:cubicBezTo>
+                  <a:pt x="1248149" y="-8503"/>
+                  <a:pt x="1588432" y="-28862"/>
+                  <a:pt x="1733809" y="0"/>
+                </a:cubicBezTo>
+                <a:cubicBezTo>
+                  <a:pt x="1879186" y="28862"/>
+                  <a:pt x="2052815" y="5974"/>
+                  <a:pt x="2297600" y="0"/>
+                </a:cubicBezTo>
+                <a:cubicBezTo>
+                  <a:pt x="2542385" y="-5974"/>
+                  <a:pt x="2699960" y="-23550"/>
+                  <a:pt x="2861391" y="0"/>
+                </a:cubicBezTo>
+                <a:cubicBezTo>
+                  <a:pt x="3022822" y="23550"/>
+                  <a:pt x="3390411" y="25272"/>
+                  <a:pt x="3552490" y="0"/>
+                </a:cubicBezTo>
+                <a:cubicBezTo>
+                  <a:pt x="3714569" y="-25272"/>
+                  <a:pt x="3950585" y="-31327"/>
+                  <a:pt x="4243589" y="0"/>
+                </a:cubicBezTo>
+                <a:cubicBezTo>
+                  <a:pt x="4244074" y="9333"/>
+                  <a:pt x="4244867" y="19699"/>
+                  <a:pt x="4243589" y="27432"/>
+                </a:cubicBezTo>
+                <a:cubicBezTo>
+                  <a:pt x="4130424" y="7904"/>
+                  <a:pt x="3932803" y="51393"/>
+                  <a:pt x="3722234" y="27432"/>
+                </a:cubicBezTo>
+                <a:cubicBezTo>
+                  <a:pt x="3511665" y="3471"/>
+                  <a:pt x="3269903" y="55138"/>
+                  <a:pt x="3116007" y="27432"/>
+                </a:cubicBezTo>
+                <a:cubicBezTo>
+                  <a:pt x="2962111" y="-274"/>
+                  <a:pt x="2744280" y="32368"/>
+                  <a:pt x="2509780" y="27432"/>
+                </a:cubicBezTo>
+                <a:cubicBezTo>
+                  <a:pt x="2275280" y="22496"/>
+                  <a:pt x="2066059" y="52808"/>
+                  <a:pt x="1945989" y="27432"/>
+                </a:cubicBezTo>
+                <a:cubicBezTo>
+                  <a:pt x="1825919" y="2056"/>
+                  <a:pt x="1407329" y="21760"/>
+                  <a:pt x="1254890" y="27432"/>
+                </a:cubicBezTo>
+                <a:cubicBezTo>
+                  <a:pt x="1102451" y="33104"/>
+                  <a:pt x="837950" y="40817"/>
+                  <a:pt x="563791" y="27432"/>
+                </a:cubicBezTo>
+                <a:cubicBezTo>
+                  <a:pt x="289632" y="14047"/>
+                  <a:pt x="132768" y="16249"/>
+                  <a:pt x="0" y="27432"/>
+                </a:cubicBezTo>
+                <a:cubicBezTo>
+                  <a:pt x="211" y="18145"/>
+                  <a:pt x="120" y="6480"/>
+                  <a:pt x="0" y="0"/>
+                </a:cubicBezTo>
+                <a:close/>
+              </a:path>
+            </a:pathLst>
+          </a:custGeom>
+          <a:solidFill>
+            <a:schemeClr val="tx1"/>
+          </a:solidFill>
+          <a:ln w="38100" cap="rnd">
+            <a:solidFill>
+              <a:schemeClr val="tx1"/>
+            </a:solidFill>
+            <a:round/>
+            <a:extLst>
+              <a:ext uri="{C807C97D-BFC1-408E-A445-0C87EB9F89A2}">
+                <ask:lineSketchStyleProps xmlns:ask="http://schemas.microsoft.com/office/drawing/2018/sketchyshapes" sd="1219033472">
+                  <a:prstGeom prst="rect">
+                    <a:avLst/>
+                  </a:prstGeom>
+                  <ask:type>
+                    <ask:lineSketchFreehand/>
+                  </ask:type>
+                </ask:lineSketchStyleProps>
+              </a:ext>
+            </a:extLst>
+          </a:ln>
+        </p:spPr>
+        <p:style>
+          <a:lnRef idx="2">
+            <a:schemeClr val="accent1">
+              <a:shade val="50000"/>
+            </a:schemeClr>
+          </a:lnRef>
+          <a:fillRef idx="1">
+            <a:schemeClr val="accent1"/>
+          </a:fillRef>
+          <a:effectRef idx="0">
+            <a:schemeClr val="accent1"/>
+          </a:effectRef>
+          <a:fontRef idx="minor">
+            <a:schemeClr val="lt1"/>
+          </a:fontRef>
+        </p:style>
+        <p:txBody>
+          <a:bodyPr rtlCol="0" anchor="ctr"/>
+          <a:lstStyle/>
+          <a:p>
+            <a:pPr algn="ctr"/>
+            <a:endParaRPr lang="en-US">
+              <a:solidFill>
+                <a:schemeClr val="tx1"/>
+              </a:solidFill>
+            </a:endParaRPr>
+          </a:p>
+        </p:txBody>
+      </p:sp>
+      <p:sp useBgFill="1">
+        <p:nvSpPr>
+          <p:cNvPr id="22" name="Rectangle 21">
+            <a:extLst>
+              <a:ext uri="{FF2B5EF4-FFF2-40B4-BE49-F238E27FC236}">
+                <a16:creationId xmlns:a16="http://schemas.microsoft.com/office/drawing/2014/main" id="{168AB93A-48BC-4C25-A3AD-C17B5A682A94}"/>
+              </a:ext>
+              <a:ext uri="{C183D7F6-B498-43B3-948B-1728B52AA6E4}">
+                <adec:decorative xmlns:adec="http://schemas.microsoft.com/office/drawing/2017/decorative" val="1"/>
+              </a:ext>
+            </a:extLst>
+          </p:cNvPr>
+          <p:cNvSpPr>
+            <a:spLocks noGrp="1" noRot="1" noChangeAspect="1" noMove="1" noResize="1" noEditPoints="1" noAdjustHandles="1" noChangeArrowheads="1" noChangeShapeType="1" noTextEdit="1"/>
+          </p:cNvSpPr>
+          <p:nvPr>
+            <p:extLst>
+              <p:ext uri="{386F3935-93C4-4BCD-93E2-E3B085C9AB24}">
+                <p16:designElem xmlns:p16="http://schemas.microsoft.com/office/powerpoint/2015/main" val="1"/>
+              </p:ext>
+            </p:extLst>
+          </p:nvPr>
+        </p:nvSpPr>
+        <p:spPr>
+          <a:xfrm>
+            <a:off x="0" y="0"/>
+            <a:ext cx="12192000" cy="6858000"/>
+          </a:xfrm>
+          <a:prstGeom prst="rect">
+            <a:avLst/>
+          </a:prstGeom>
+          <a:ln>
+            <a:noFill/>
+          </a:ln>
+        </p:spPr>
+        <p:style>
+          <a:lnRef idx="2">
+            <a:schemeClr val="accent1">
+              <a:shade val="50000"/>
+            </a:schemeClr>
+          </a:lnRef>
+          <a:fillRef idx="1">
+            <a:schemeClr val="accent1"/>
+          </a:fillRef>
+          <a:effectRef idx="0">
+            <a:schemeClr val="accent1"/>
+          </a:effectRef>
+          <a:fontRef idx="minor">
+            <a:schemeClr val="lt1"/>
+          </a:fontRef>
+        </p:style>
+        <p:txBody>
+          <a:bodyPr rtlCol="0" anchor="ctr"/>
+          <a:lstStyle/>
+          <a:p>
+            <a:pPr algn="ctr"/>
+            <a:endParaRPr lang="en-US"/>
+          </a:p>
+        </p:txBody>
+      </p:sp>
+      <p:sp>
+        <p:nvSpPr>
           <p:cNvPr id="2" name="Title 1">
             <a:extLst>
               <a:ext uri="{FF2B5EF4-FFF2-40B4-BE49-F238E27FC236}">
@@ -7519,13 +8216,20 @@
             <p:ph type="title"/>
           </p:nvPr>
         </p:nvSpPr>
-        <p:spPr/>
+        <p:spPr>
+          <a:xfrm>
+            <a:off x="7998581" y="643467"/>
+            <a:ext cx="3562483" cy="3569241"/>
+          </a:xfrm>
+        </p:spPr>
         <p:txBody>
-          <a:bodyPr/>
+          <a:bodyPr vert="horz" lIns="91440" tIns="45720" rIns="91440" bIns="45720" rtlCol="0" anchor="b">
+            <a:normAutofit/>
+          </a:bodyPr>
           <a:lstStyle/>
           <a:p>
             <a:r>
-              <a:rPr lang="en-US" dirty="0"/>
+              <a:rPr lang="en-US" sz="5800"/>
               <a:t>Presentation Overview</a:t>
             </a:r>
           </a:p>
@@ -7533,29 +8237,306 @@
       </p:sp>
       <p:sp>
         <p:nvSpPr>
-          <p:cNvPr id="3" name="Content Placeholder 2">
+          <p:cNvPr id="24" name="Rectangle 6">
             <a:extLst>
               <a:ext uri="{FF2B5EF4-FFF2-40B4-BE49-F238E27FC236}">
-                <a16:creationId xmlns:a16="http://schemas.microsoft.com/office/drawing/2014/main" id="{8ED5D513-BC70-4E4E-8979-11B9CDBC4CE3}"/>
+                <a16:creationId xmlns:a16="http://schemas.microsoft.com/office/drawing/2014/main" id="{3FCFB1DE-0B7E-48CC-BA90-B2AB0889F9D6}"/>
+              </a:ext>
+              <a:ext uri="{C183D7F6-B498-43B3-948B-1728B52AA6E4}">
+                <adec:decorative xmlns:adec="http://schemas.microsoft.com/office/drawing/2017/decorative" val="1"/>
               </a:ext>
             </a:extLst>
           </p:cNvPr>
           <p:cNvSpPr>
-            <a:spLocks noGrp="1"/>
+            <a:spLocks noGrp="1" noRot="1" noChangeAspect="1" noMove="1" noResize="1" noEditPoints="1" noAdjustHandles="1" noChangeArrowheads="1" noChangeShapeType="1" noTextEdit="1"/>
           </p:cNvSpPr>
           <p:nvPr>
-            <p:ph idx="1"/>
+            <p:extLst>
+              <p:ext uri="{386F3935-93C4-4BCD-93E2-E3B085C9AB24}">
+                <p16:designElem xmlns:p16="http://schemas.microsoft.com/office/powerpoint/2015/main" val="1"/>
+              </p:ext>
+            </p:extLst>
           </p:nvPr>
         </p:nvSpPr>
-        <p:spPr/>
+        <p:spPr>
+          <a:xfrm>
+            <a:off x="8005874" y="4409267"/>
+            <a:ext cx="3242551" cy="27432"/>
+          </a:xfrm>
+          <a:custGeom>
+            <a:avLst/>
+            <a:gdLst>
+              <a:gd name="connsiteX0" fmla="*/ 0 w 3242551"/>
+              <a:gd name="connsiteY0" fmla="*/ 0 h 27432"/>
+              <a:gd name="connsiteX1" fmla="*/ 616085 w 3242551"/>
+              <a:gd name="connsiteY1" fmla="*/ 0 h 27432"/>
+              <a:gd name="connsiteX2" fmla="*/ 1264595 w 3242551"/>
+              <a:gd name="connsiteY2" fmla="*/ 0 h 27432"/>
+              <a:gd name="connsiteX3" fmla="*/ 1945531 w 3242551"/>
+              <a:gd name="connsiteY3" fmla="*/ 0 h 27432"/>
+              <a:gd name="connsiteX4" fmla="*/ 2626466 w 3242551"/>
+              <a:gd name="connsiteY4" fmla="*/ 0 h 27432"/>
+              <a:gd name="connsiteX5" fmla="*/ 3242551 w 3242551"/>
+              <a:gd name="connsiteY5" fmla="*/ 0 h 27432"/>
+              <a:gd name="connsiteX6" fmla="*/ 3242551 w 3242551"/>
+              <a:gd name="connsiteY6" fmla="*/ 27432 h 27432"/>
+              <a:gd name="connsiteX7" fmla="*/ 2529190 w 3242551"/>
+              <a:gd name="connsiteY7" fmla="*/ 27432 h 27432"/>
+              <a:gd name="connsiteX8" fmla="*/ 1815829 w 3242551"/>
+              <a:gd name="connsiteY8" fmla="*/ 27432 h 27432"/>
+              <a:gd name="connsiteX9" fmla="*/ 1167318 w 3242551"/>
+              <a:gd name="connsiteY9" fmla="*/ 27432 h 27432"/>
+              <a:gd name="connsiteX10" fmla="*/ 0 w 3242551"/>
+              <a:gd name="connsiteY10" fmla="*/ 27432 h 27432"/>
+              <a:gd name="connsiteX11" fmla="*/ 0 w 3242551"/>
+              <a:gd name="connsiteY11" fmla="*/ 0 h 27432"/>
+            </a:gdLst>
+            <a:ahLst/>
+            <a:cxnLst>
+              <a:cxn ang="0">
+                <a:pos x="connsiteX0" y="connsiteY0"/>
+              </a:cxn>
+              <a:cxn ang="0">
+                <a:pos x="connsiteX1" y="connsiteY1"/>
+              </a:cxn>
+              <a:cxn ang="0">
+                <a:pos x="connsiteX2" y="connsiteY2"/>
+              </a:cxn>
+              <a:cxn ang="0">
+                <a:pos x="connsiteX3" y="connsiteY3"/>
+              </a:cxn>
+              <a:cxn ang="0">
+                <a:pos x="connsiteX4" y="connsiteY4"/>
+              </a:cxn>
+              <a:cxn ang="0">
+                <a:pos x="connsiteX5" y="connsiteY5"/>
+              </a:cxn>
+              <a:cxn ang="0">
+                <a:pos x="connsiteX6" y="connsiteY6"/>
+              </a:cxn>
+              <a:cxn ang="0">
+                <a:pos x="connsiteX7" y="connsiteY7"/>
+              </a:cxn>
+              <a:cxn ang="0">
+                <a:pos x="connsiteX8" y="connsiteY8"/>
+              </a:cxn>
+              <a:cxn ang="0">
+                <a:pos x="connsiteX9" y="connsiteY9"/>
+              </a:cxn>
+              <a:cxn ang="0">
+                <a:pos x="connsiteX10" y="connsiteY10"/>
+              </a:cxn>
+              <a:cxn ang="0">
+                <a:pos x="connsiteX11" y="connsiteY11"/>
+              </a:cxn>
+            </a:cxnLst>
+            <a:rect l="l" t="t" r="r" b="b"/>
+            <a:pathLst>
+              <a:path w="3242551" h="27432" fill="none" extrusionOk="0">
+                <a:moveTo>
+                  <a:pt x="0" y="0"/>
+                </a:moveTo>
+                <a:cubicBezTo>
+                  <a:pt x="194108" y="-30346"/>
+                  <a:pt x="476260" y="9901"/>
+                  <a:pt x="616085" y="0"/>
+                </a:cubicBezTo>
+                <a:cubicBezTo>
+                  <a:pt x="755911" y="-9901"/>
+                  <a:pt x="955441" y="-31994"/>
+                  <a:pt x="1264595" y="0"/>
+                </a:cubicBezTo>
+                <a:cubicBezTo>
+                  <a:pt x="1573749" y="31994"/>
+                  <a:pt x="1618785" y="-7447"/>
+                  <a:pt x="1945531" y="0"/>
+                </a:cubicBezTo>
+                <a:cubicBezTo>
+                  <a:pt x="2272277" y="7447"/>
+                  <a:pt x="2390625" y="1646"/>
+                  <a:pt x="2626466" y="0"/>
+                </a:cubicBezTo>
+                <a:cubicBezTo>
+                  <a:pt x="2862308" y="-1646"/>
+                  <a:pt x="3064770" y="5184"/>
+                  <a:pt x="3242551" y="0"/>
+                </a:cubicBezTo>
+                <a:cubicBezTo>
+                  <a:pt x="3241385" y="7395"/>
+                  <a:pt x="3242596" y="21864"/>
+                  <a:pt x="3242551" y="27432"/>
+                </a:cubicBezTo>
+                <a:cubicBezTo>
+                  <a:pt x="3023282" y="59750"/>
+                  <a:pt x="2875833" y="36030"/>
+                  <a:pt x="2529190" y="27432"/>
+                </a:cubicBezTo>
+                <a:cubicBezTo>
+                  <a:pt x="2182547" y="18834"/>
+                  <a:pt x="2011286" y="10066"/>
+                  <a:pt x="1815829" y="27432"/>
+                </a:cubicBezTo>
+                <a:cubicBezTo>
+                  <a:pt x="1620372" y="44798"/>
+                  <a:pt x="1410011" y="-1058"/>
+                  <a:pt x="1167318" y="27432"/>
+                </a:cubicBezTo>
+                <a:cubicBezTo>
+                  <a:pt x="924625" y="55922"/>
+                  <a:pt x="241931" y="85033"/>
+                  <a:pt x="0" y="27432"/>
+                </a:cubicBezTo>
+                <a:cubicBezTo>
+                  <a:pt x="-503" y="20663"/>
+                  <a:pt x="1168" y="5855"/>
+                  <a:pt x="0" y="0"/>
+                </a:cubicBezTo>
+                <a:close/>
+              </a:path>
+              <a:path w="3242551" h="27432" stroke="0" extrusionOk="0">
+                <a:moveTo>
+                  <a:pt x="0" y="0"/>
+                </a:moveTo>
+                <a:cubicBezTo>
+                  <a:pt x="292987" y="-12051"/>
+                  <a:pt x="313221" y="-4437"/>
+                  <a:pt x="616085" y="0"/>
+                </a:cubicBezTo>
+                <a:cubicBezTo>
+                  <a:pt x="918950" y="4437"/>
+                  <a:pt x="1001475" y="-7765"/>
+                  <a:pt x="1167318" y="0"/>
+                </a:cubicBezTo>
+                <a:cubicBezTo>
+                  <a:pt x="1333161" y="7765"/>
+                  <a:pt x="1642740" y="34995"/>
+                  <a:pt x="1880680" y="0"/>
+                </a:cubicBezTo>
+                <a:cubicBezTo>
+                  <a:pt x="2118620" y="-34995"/>
+                  <a:pt x="2326628" y="756"/>
+                  <a:pt x="2496764" y="0"/>
+                </a:cubicBezTo>
+                <a:cubicBezTo>
+                  <a:pt x="2666900" y="-756"/>
+                  <a:pt x="2887316" y="25599"/>
+                  <a:pt x="3242551" y="0"/>
+                </a:cubicBezTo>
+                <a:cubicBezTo>
+                  <a:pt x="3242744" y="12649"/>
+                  <a:pt x="3241563" y="17989"/>
+                  <a:pt x="3242551" y="27432"/>
+                </a:cubicBezTo>
+                <a:cubicBezTo>
+                  <a:pt x="3008998" y="-2757"/>
+                  <a:pt x="2799879" y="44559"/>
+                  <a:pt x="2594041" y="27432"/>
+                </a:cubicBezTo>
+                <a:cubicBezTo>
+                  <a:pt x="2388203" y="10306"/>
+                  <a:pt x="2212925" y="-2221"/>
+                  <a:pt x="1880680" y="27432"/>
+                </a:cubicBezTo>
+                <a:cubicBezTo>
+                  <a:pt x="1548435" y="57085"/>
+                  <a:pt x="1523943" y="37041"/>
+                  <a:pt x="1329446" y="27432"/>
+                </a:cubicBezTo>
+                <a:cubicBezTo>
+                  <a:pt x="1134949" y="17823"/>
+                  <a:pt x="919920" y="28299"/>
+                  <a:pt x="680936" y="27432"/>
+                </a:cubicBezTo>
+                <a:cubicBezTo>
+                  <a:pt x="441952" y="26566"/>
+                  <a:pt x="273000" y="57219"/>
+                  <a:pt x="0" y="27432"/>
+                </a:cubicBezTo>
+                <a:cubicBezTo>
+                  <a:pt x="1300" y="19678"/>
+                  <a:pt x="-86" y="12044"/>
+                  <a:pt x="0" y="0"/>
+                </a:cubicBezTo>
+                <a:close/>
+              </a:path>
+            </a:pathLst>
+          </a:custGeom>
+          <a:solidFill>
+            <a:srgbClr val="148497"/>
+          </a:solidFill>
+          <a:ln w="38100" cap="rnd">
+            <a:solidFill>
+              <a:srgbClr val="148497"/>
+            </a:solidFill>
+            <a:round/>
+            <a:extLst>
+              <a:ext uri="{C807C97D-BFC1-408E-A445-0C87EB9F89A2}">
+                <ask:lineSketchStyleProps xmlns:ask="http://schemas.microsoft.com/office/drawing/2018/sketchyshapes" sd="1219033472">
+                  <a:prstGeom prst="rect">
+                    <a:avLst/>
+                  </a:prstGeom>
+                  <ask:type>
+                    <ask:lineSketchFreehand/>
+                  </ask:type>
+                </ask:lineSketchStyleProps>
+              </a:ext>
+            </a:extLst>
+          </a:ln>
+        </p:spPr>
+        <p:style>
+          <a:lnRef idx="2">
+            <a:schemeClr val="accent1">
+              <a:shade val="50000"/>
+            </a:schemeClr>
+          </a:lnRef>
+          <a:fillRef idx="1">
+            <a:schemeClr val="accent1"/>
+          </a:fillRef>
+          <a:effectRef idx="0">
+            <a:schemeClr val="accent1"/>
+          </a:effectRef>
+          <a:fontRef idx="minor">
+            <a:schemeClr val="lt1"/>
+          </a:fontRef>
+        </p:style>
         <p:txBody>
-          <a:bodyPr/>
+          <a:bodyPr rtlCol="0" anchor="ctr"/>
           <a:lstStyle/>
           <a:p>
+            <a:pPr algn="ctr"/>
             <a:endParaRPr lang="en-US"/>
           </a:p>
         </p:txBody>
       </p:sp>
+      <p:pic>
+        <p:nvPicPr>
+          <p:cNvPr id="5" name="Picture 4" descr="A close - up of a microphone&#10;&#10;Description automatically generated with low confidence">
+            <a:extLst>
+              <a:ext uri="{FF2B5EF4-FFF2-40B4-BE49-F238E27FC236}">
+                <a16:creationId xmlns:a16="http://schemas.microsoft.com/office/drawing/2014/main" id="{BA893595-DFD6-44FF-93FB-3185B787EDC4}"/>
+              </a:ext>
+            </a:extLst>
+          </p:cNvPr>
+          <p:cNvPicPr>
+            <a:picLocks noChangeAspect="1"/>
+          </p:cNvPicPr>
+          <p:nvPr/>
+        </p:nvPicPr>
+        <p:blipFill rotWithShape="1">
+          <a:blip r:embed="rId2"/>
+          <a:srcRect t="10000"/>
+          <a:stretch/>
+        </p:blipFill>
+        <p:spPr>
+          <a:xfrm>
+            <a:off x="320040" y="1386173"/>
+            <a:ext cx="7214616" cy="4058221"/>
+          </a:xfrm>
+          <a:prstGeom prst="rect">
+            <a:avLst/>
+          </a:prstGeom>
+        </p:spPr>
+      </p:pic>
     </p:spTree>
     <p:extLst>
       <p:ext uri="{BB962C8B-B14F-4D97-AF65-F5344CB8AC3E}">
@@ -8155,6 +9136,2037 @@
     <p:extLst>
       <p:ext uri="{BB962C8B-B14F-4D97-AF65-F5344CB8AC3E}">
         <p14:creationId xmlns:p14="http://schemas.microsoft.com/office/powerpoint/2010/main" val="3389986444"/>
+      </p:ext>
+    </p:extLst>
+  </p:cSld>
+  <p:clrMapOvr>
+    <a:masterClrMapping/>
+  </p:clrMapOvr>
+</p:sld>
+</file>
+
+<file path=ppt/slides/slide4.xml><?xml version="1.0" encoding="utf-8"?>
+<p:sld xmlns:a="http://schemas.openxmlformats.org/drawingml/2006/main" xmlns:r="http://schemas.openxmlformats.org/officeDocument/2006/relationships" xmlns:p="http://schemas.openxmlformats.org/presentationml/2006/main">
+  <p:cSld>
+    <p:bg>
+      <p:bgPr>
+        <a:solidFill>
+          <a:schemeClr val="bg1"/>
+        </a:solidFill>
+        <a:effectLst/>
+      </p:bgPr>
+    </p:bg>
+    <p:spTree>
+      <p:nvGrpSpPr>
+        <p:cNvPr id="1" name=""/>
+        <p:cNvGrpSpPr/>
+        <p:nvPr/>
+      </p:nvGrpSpPr>
+      <p:grpSpPr>
+        <a:xfrm>
+          <a:off x="0" y="0"/>
+          <a:ext cx="0" cy="0"/>
+          <a:chOff x="0" y="0"/>
+          <a:chExt cx="0" cy="0"/>
+        </a:xfrm>
+      </p:grpSpPr>
+      <p:sp useBgFill="1">
+        <p:nvSpPr>
+          <p:cNvPr id="9" name="Rectangle 8">
+            <a:extLst>
+              <a:ext uri="{FF2B5EF4-FFF2-40B4-BE49-F238E27FC236}">
+                <a16:creationId xmlns:a16="http://schemas.microsoft.com/office/drawing/2014/main" id="{2C61293E-6EBE-43EF-A52C-9BEBFD7679D4}"/>
+              </a:ext>
+              <a:ext uri="{C183D7F6-B498-43B3-948B-1728B52AA6E4}">
+                <adec:decorative xmlns:adec="http://schemas.microsoft.com/office/drawing/2017/decorative" val="1"/>
+              </a:ext>
+            </a:extLst>
+          </p:cNvPr>
+          <p:cNvSpPr>
+            <a:spLocks noGrp="1" noRot="1" noChangeAspect="1" noMove="1" noResize="1" noEditPoints="1" noAdjustHandles="1" noChangeArrowheads="1" noChangeShapeType="1" noTextEdit="1"/>
+          </p:cNvSpPr>
+          <p:nvPr>
+            <p:extLst>
+              <p:ext uri="{386F3935-93C4-4BCD-93E2-E3B085C9AB24}">
+                <p16:designElem xmlns:p16="http://schemas.microsoft.com/office/powerpoint/2015/main" val="1"/>
+              </p:ext>
+            </p:extLst>
+          </p:nvPr>
+        </p:nvSpPr>
+        <p:spPr>
+          <a:xfrm>
+            <a:off x="0" y="0"/>
+            <a:ext cx="12188952" cy="6858000"/>
+          </a:xfrm>
+          <a:prstGeom prst="rect">
+            <a:avLst/>
+          </a:prstGeom>
+          <a:ln>
+            <a:noFill/>
+          </a:ln>
+        </p:spPr>
+        <p:style>
+          <a:lnRef idx="2">
+            <a:schemeClr val="accent1">
+              <a:shade val="50000"/>
+            </a:schemeClr>
+          </a:lnRef>
+          <a:fillRef idx="1">
+            <a:schemeClr val="accent1"/>
+          </a:fillRef>
+          <a:effectRef idx="0">
+            <a:schemeClr val="accent1"/>
+          </a:effectRef>
+          <a:fontRef idx="minor">
+            <a:schemeClr val="lt1"/>
+          </a:fontRef>
+        </p:style>
+        <p:txBody>
+          <a:bodyPr rtlCol="0" anchor="ctr"/>
+          <a:lstStyle/>
+          <a:p>
+            <a:pPr algn="ctr"/>
+            <a:endParaRPr lang="en-US"/>
+          </a:p>
+        </p:txBody>
+      </p:sp>
+      <p:sp>
+        <p:nvSpPr>
+          <p:cNvPr id="2" name="Title 1">
+            <a:extLst>
+              <a:ext uri="{FF2B5EF4-FFF2-40B4-BE49-F238E27FC236}">
+                <a16:creationId xmlns:a16="http://schemas.microsoft.com/office/drawing/2014/main" id="{493E4F06-8A4F-4241-8E34-E41DF7795EF5}"/>
+              </a:ext>
+            </a:extLst>
+          </p:cNvPr>
+          <p:cNvSpPr>
+            <a:spLocks noGrp="1"/>
+          </p:cNvSpPr>
+          <p:nvPr>
+            <p:ph type="title"/>
+          </p:nvPr>
+        </p:nvSpPr>
+        <p:spPr>
+          <a:xfrm>
+            <a:off x="5297762" y="329184"/>
+            <a:ext cx="6251110" cy="1783080"/>
+          </a:xfrm>
+        </p:spPr>
+        <p:txBody>
+          <a:bodyPr anchor="b">
+            <a:normAutofit/>
+          </a:bodyPr>
+          <a:lstStyle/>
+          <a:p>
+            <a:r>
+              <a:rPr lang="en-US" sz="7200"/>
+              <a:t>Misinformation</a:t>
+            </a:r>
+          </a:p>
+        </p:txBody>
+      </p:sp>
+      <p:sp>
+        <p:nvSpPr>
+          <p:cNvPr id="11" name="Rectangle 6">
+            <a:extLst>
+              <a:ext uri="{FF2B5EF4-FFF2-40B4-BE49-F238E27FC236}">
+                <a16:creationId xmlns:a16="http://schemas.microsoft.com/office/drawing/2014/main" id="{3FCFB1DE-0B7E-48CC-BA90-B2AB0889F9D6}"/>
+              </a:ext>
+              <a:ext uri="{C183D7F6-B498-43B3-948B-1728B52AA6E4}">
+                <adec:decorative xmlns:adec="http://schemas.microsoft.com/office/drawing/2017/decorative" val="1"/>
+              </a:ext>
+            </a:extLst>
+          </p:cNvPr>
+          <p:cNvSpPr>
+            <a:spLocks noGrp="1" noRot="1" noChangeAspect="1" noMove="1" noResize="1" noEditPoints="1" noAdjustHandles="1" noChangeArrowheads="1" noChangeShapeType="1" noTextEdit="1"/>
+          </p:cNvSpPr>
+          <p:nvPr>
+            <p:extLst>
+              <p:ext uri="{386F3935-93C4-4BCD-93E2-E3B085C9AB24}">
+                <p16:designElem xmlns:p16="http://schemas.microsoft.com/office/powerpoint/2015/main" val="1"/>
+              </p:ext>
+            </p:extLst>
+          </p:nvPr>
+        </p:nvSpPr>
+        <p:spPr>
+          <a:xfrm>
+            <a:off x="5412862" y="2395728"/>
+            <a:ext cx="4243589" cy="27432"/>
+          </a:xfrm>
+          <a:custGeom>
+            <a:avLst/>
+            <a:gdLst>
+              <a:gd name="connsiteX0" fmla="*/ 0 w 4243589"/>
+              <a:gd name="connsiteY0" fmla="*/ 0 h 27432"/>
+              <a:gd name="connsiteX1" fmla="*/ 563791 w 4243589"/>
+              <a:gd name="connsiteY1" fmla="*/ 0 h 27432"/>
+              <a:gd name="connsiteX2" fmla="*/ 1042710 w 4243589"/>
+              <a:gd name="connsiteY2" fmla="*/ 0 h 27432"/>
+              <a:gd name="connsiteX3" fmla="*/ 1564066 w 4243589"/>
+              <a:gd name="connsiteY3" fmla="*/ 0 h 27432"/>
+              <a:gd name="connsiteX4" fmla="*/ 2212729 w 4243589"/>
+              <a:gd name="connsiteY4" fmla="*/ 0 h 27432"/>
+              <a:gd name="connsiteX5" fmla="*/ 2776520 w 4243589"/>
+              <a:gd name="connsiteY5" fmla="*/ 0 h 27432"/>
+              <a:gd name="connsiteX6" fmla="*/ 3297875 w 4243589"/>
+              <a:gd name="connsiteY6" fmla="*/ 0 h 27432"/>
+              <a:gd name="connsiteX7" fmla="*/ 4243589 w 4243589"/>
+              <a:gd name="connsiteY7" fmla="*/ 0 h 27432"/>
+              <a:gd name="connsiteX8" fmla="*/ 4243589 w 4243589"/>
+              <a:gd name="connsiteY8" fmla="*/ 27432 h 27432"/>
+              <a:gd name="connsiteX9" fmla="*/ 3637362 w 4243589"/>
+              <a:gd name="connsiteY9" fmla="*/ 27432 h 27432"/>
+              <a:gd name="connsiteX10" fmla="*/ 3116007 w 4243589"/>
+              <a:gd name="connsiteY10" fmla="*/ 27432 h 27432"/>
+              <a:gd name="connsiteX11" fmla="*/ 2424908 w 4243589"/>
+              <a:gd name="connsiteY11" fmla="*/ 27432 h 27432"/>
+              <a:gd name="connsiteX12" fmla="*/ 1861117 w 4243589"/>
+              <a:gd name="connsiteY12" fmla="*/ 27432 h 27432"/>
+              <a:gd name="connsiteX13" fmla="*/ 1382198 w 4243589"/>
+              <a:gd name="connsiteY13" fmla="*/ 27432 h 27432"/>
+              <a:gd name="connsiteX14" fmla="*/ 733535 w 4243589"/>
+              <a:gd name="connsiteY14" fmla="*/ 27432 h 27432"/>
+              <a:gd name="connsiteX15" fmla="*/ 0 w 4243589"/>
+              <a:gd name="connsiteY15" fmla="*/ 27432 h 27432"/>
+              <a:gd name="connsiteX16" fmla="*/ 0 w 4243589"/>
+              <a:gd name="connsiteY16" fmla="*/ 0 h 27432"/>
+            </a:gdLst>
+            <a:ahLst/>
+            <a:cxnLst>
+              <a:cxn ang="0">
+                <a:pos x="connsiteX0" y="connsiteY0"/>
+              </a:cxn>
+              <a:cxn ang="0">
+                <a:pos x="connsiteX1" y="connsiteY1"/>
+              </a:cxn>
+              <a:cxn ang="0">
+                <a:pos x="connsiteX2" y="connsiteY2"/>
+              </a:cxn>
+              <a:cxn ang="0">
+                <a:pos x="connsiteX3" y="connsiteY3"/>
+              </a:cxn>
+              <a:cxn ang="0">
+                <a:pos x="connsiteX4" y="connsiteY4"/>
+              </a:cxn>
+              <a:cxn ang="0">
+                <a:pos x="connsiteX5" y="connsiteY5"/>
+              </a:cxn>
+              <a:cxn ang="0">
+                <a:pos x="connsiteX6" y="connsiteY6"/>
+              </a:cxn>
+              <a:cxn ang="0">
+                <a:pos x="connsiteX7" y="connsiteY7"/>
+              </a:cxn>
+              <a:cxn ang="0">
+                <a:pos x="connsiteX8" y="connsiteY8"/>
+              </a:cxn>
+              <a:cxn ang="0">
+                <a:pos x="connsiteX9" y="connsiteY9"/>
+              </a:cxn>
+              <a:cxn ang="0">
+                <a:pos x="connsiteX10" y="connsiteY10"/>
+              </a:cxn>
+              <a:cxn ang="0">
+                <a:pos x="connsiteX11" y="connsiteY11"/>
+              </a:cxn>
+              <a:cxn ang="0">
+                <a:pos x="connsiteX12" y="connsiteY12"/>
+              </a:cxn>
+              <a:cxn ang="0">
+                <a:pos x="connsiteX13" y="connsiteY13"/>
+              </a:cxn>
+              <a:cxn ang="0">
+                <a:pos x="connsiteX14" y="connsiteY14"/>
+              </a:cxn>
+              <a:cxn ang="0">
+                <a:pos x="connsiteX15" y="connsiteY15"/>
+              </a:cxn>
+              <a:cxn ang="0">
+                <a:pos x="connsiteX16" y="connsiteY16"/>
+              </a:cxn>
+            </a:cxnLst>
+            <a:rect l="l" t="t" r="r" b="b"/>
+            <a:pathLst>
+              <a:path w="4243589" h="27432" fill="none" extrusionOk="0">
+                <a:moveTo>
+                  <a:pt x="0" y="0"/>
+                </a:moveTo>
+                <a:cubicBezTo>
+                  <a:pt x="157351" y="-15653"/>
+                  <a:pt x="378877" y="-5828"/>
+                  <a:pt x="563791" y="0"/>
+                </a:cubicBezTo>
+                <a:cubicBezTo>
+                  <a:pt x="748705" y="5828"/>
+                  <a:pt x="905659" y="-5525"/>
+                  <a:pt x="1042710" y="0"/>
+                </a:cubicBezTo>
+                <a:cubicBezTo>
+                  <a:pt x="1179761" y="5525"/>
+                  <a:pt x="1356845" y="-21288"/>
+                  <a:pt x="1564066" y="0"/>
+                </a:cubicBezTo>
+                <a:cubicBezTo>
+                  <a:pt x="1771287" y="21288"/>
+                  <a:pt x="1912099" y="25135"/>
+                  <a:pt x="2212729" y="0"/>
+                </a:cubicBezTo>
+                <a:cubicBezTo>
+                  <a:pt x="2513359" y="-25135"/>
+                  <a:pt x="2514918" y="-27119"/>
+                  <a:pt x="2776520" y="0"/>
+                </a:cubicBezTo>
+                <a:cubicBezTo>
+                  <a:pt x="3038122" y="27119"/>
+                  <a:pt x="3178771" y="18116"/>
+                  <a:pt x="3297875" y="0"/>
+                </a:cubicBezTo>
+                <a:cubicBezTo>
+                  <a:pt x="3416980" y="-18116"/>
+                  <a:pt x="4012240" y="-40869"/>
+                  <a:pt x="4243589" y="0"/>
+                </a:cubicBezTo>
+                <a:cubicBezTo>
+                  <a:pt x="4242616" y="8304"/>
+                  <a:pt x="4243111" y="21512"/>
+                  <a:pt x="4243589" y="27432"/>
+                </a:cubicBezTo>
+                <a:cubicBezTo>
+                  <a:pt x="4112949" y="6289"/>
+                  <a:pt x="3928037" y="10975"/>
+                  <a:pt x="3637362" y="27432"/>
+                </a:cubicBezTo>
+                <a:cubicBezTo>
+                  <a:pt x="3346687" y="43889"/>
+                  <a:pt x="3254446" y="35813"/>
+                  <a:pt x="3116007" y="27432"/>
+                </a:cubicBezTo>
+                <a:cubicBezTo>
+                  <a:pt x="2977569" y="19051"/>
+                  <a:pt x="2620228" y="38017"/>
+                  <a:pt x="2424908" y="27432"/>
+                </a:cubicBezTo>
+                <a:cubicBezTo>
+                  <a:pt x="2229588" y="16847"/>
+                  <a:pt x="2088287" y="5290"/>
+                  <a:pt x="1861117" y="27432"/>
+                </a:cubicBezTo>
+                <a:cubicBezTo>
+                  <a:pt x="1633947" y="49574"/>
+                  <a:pt x="1502447" y="8273"/>
+                  <a:pt x="1382198" y="27432"/>
+                </a:cubicBezTo>
+                <a:cubicBezTo>
+                  <a:pt x="1261949" y="46591"/>
+                  <a:pt x="1045440" y="37497"/>
+                  <a:pt x="733535" y="27432"/>
+                </a:cubicBezTo>
+                <a:cubicBezTo>
+                  <a:pt x="421630" y="17367"/>
+                  <a:pt x="341257" y="-9215"/>
+                  <a:pt x="0" y="27432"/>
+                </a:cubicBezTo>
+                <a:cubicBezTo>
+                  <a:pt x="-1048" y="14992"/>
+                  <a:pt x="-1120" y="7447"/>
+                  <a:pt x="0" y="0"/>
+                </a:cubicBezTo>
+                <a:close/>
+              </a:path>
+              <a:path w="4243589" h="27432" stroke="0" extrusionOk="0">
+                <a:moveTo>
+                  <a:pt x="0" y="0"/>
+                </a:moveTo>
+                <a:cubicBezTo>
+                  <a:pt x="128164" y="17204"/>
+                  <a:pt x="312653" y="1129"/>
+                  <a:pt x="563791" y="0"/>
+                </a:cubicBezTo>
+                <a:cubicBezTo>
+                  <a:pt x="814929" y="-1129"/>
+                  <a:pt x="837271" y="8503"/>
+                  <a:pt x="1042710" y="0"/>
+                </a:cubicBezTo>
+                <a:cubicBezTo>
+                  <a:pt x="1248149" y="-8503"/>
+                  <a:pt x="1588432" y="-28862"/>
+                  <a:pt x="1733809" y="0"/>
+                </a:cubicBezTo>
+                <a:cubicBezTo>
+                  <a:pt x="1879186" y="28862"/>
+                  <a:pt x="2052815" y="5974"/>
+                  <a:pt x="2297600" y="0"/>
+                </a:cubicBezTo>
+                <a:cubicBezTo>
+                  <a:pt x="2542385" y="-5974"/>
+                  <a:pt x="2699960" y="-23550"/>
+                  <a:pt x="2861391" y="0"/>
+                </a:cubicBezTo>
+                <a:cubicBezTo>
+                  <a:pt x="3022822" y="23550"/>
+                  <a:pt x="3390411" y="25272"/>
+                  <a:pt x="3552490" y="0"/>
+                </a:cubicBezTo>
+                <a:cubicBezTo>
+                  <a:pt x="3714569" y="-25272"/>
+                  <a:pt x="3950585" y="-31327"/>
+                  <a:pt x="4243589" y="0"/>
+                </a:cubicBezTo>
+                <a:cubicBezTo>
+                  <a:pt x="4244074" y="9333"/>
+                  <a:pt x="4244867" y="19699"/>
+                  <a:pt x="4243589" y="27432"/>
+                </a:cubicBezTo>
+                <a:cubicBezTo>
+                  <a:pt x="4130424" y="7904"/>
+                  <a:pt x="3932803" y="51393"/>
+                  <a:pt x="3722234" y="27432"/>
+                </a:cubicBezTo>
+                <a:cubicBezTo>
+                  <a:pt x="3511665" y="3471"/>
+                  <a:pt x="3269903" y="55138"/>
+                  <a:pt x="3116007" y="27432"/>
+                </a:cubicBezTo>
+                <a:cubicBezTo>
+                  <a:pt x="2962111" y="-274"/>
+                  <a:pt x="2744280" y="32368"/>
+                  <a:pt x="2509780" y="27432"/>
+                </a:cubicBezTo>
+                <a:cubicBezTo>
+                  <a:pt x="2275280" y="22496"/>
+                  <a:pt x="2066059" y="52808"/>
+                  <a:pt x="1945989" y="27432"/>
+                </a:cubicBezTo>
+                <a:cubicBezTo>
+                  <a:pt x="1825919" y="2056"/>
+                  <a:pt x="1407329" y="21760"/>
+                  <a:pt x="1254890" y="27432"/>
+                </a:cubicBezTo>
+                <a:cubicBezTo>
+                  <a:pt x="1102451" y="33104"/>
+                  <a:pt x="837950" y="40817"/>
+                  <a:pt x="563791" y="27432"/>
+                </a:cubicBezTo>
+                <a:cubicBezTo>
+                  <a:pt x="289632" y="14047"/>
+                  <a:pt x="132768" y="16249"/>
+                  <a:pt x="0" y="27432"/>
+                </a:cubicBezTo>
+                <a:cubicBezTo>
+                  <a:pt x="211" y="18145"/>
+                  <a:pt x="120" y="6480"/>
+                  <a:pt x="0" y="0"/>
+                </a:cubicBezTo>
+                <a:close/>
+              </a:path>
+            </a:pathLst>
+          </a:custGeom>
+          <a:solidFill>
+            <a:schemeClr val="accent1"/>
+          </a:solidFill>
+          <a:ln w="38100" cap="rnd">
+            <a:solidFill>
+              <a:schemeClr val="accent1"/>
+            </a:solidFill>
+            <a:round/>
+            <a:extLst>
+              <a:ext uri="{C807C97D-BFC1-408E-A445-0C87EB9F89A2}">
+                <ask:lineSketchStyleProps xmlns:ask="http://schemas.microsoft.com/office/drawing/2018/sketchyshapes" sd="1219033472">
+                  <a:prstGeom prst="rect">
+                    <a:avLst/>
+                  </a:prstGeom>
+                  <ask:type>
+                    <ask:lineSketchFreehand/>
+                  </ask:type>
+                </ask:lineSketchStyleProps>
+              </a:ext>
+            </a:extLst>
+          </a:ln>
+        </p:spPr>
+        <p:style>
+          <a:lnRef idx="2">
+            <a:schemeClr val="accent1">
+              <a:shade val="50000"/>
+            </a:schemeClr>
+          </a:lnRef>
+          <a:fillRef idx="1">
+            <a:schemeClr val="accent1"/>
+          </a:fillRef>
+          <a:effectRef idx="0">
+            <a:schemeClr val="accent1"/>
+          </a:effectRef>
+          <a:fontRef idx="minor">
+            <a:schemeClr val="lt1"/>
+          </a:fontRef>
+        </p:style>
+        <p:txBody>
+          <a:bodyPr rtlCol="0" anchor="ctr"/>
+          <a:lstStyle/>
+          <a:p>
+            <a:pPr algn="ctr"/>
+            <a:endParaRPr lang="en-US"/>
+          </a:p>
+        </p:txBody>
+      </p:sp>
+      <p:sp>
+        <p:nvSpPr>
+          <p:cNvPr id="3" name="Content Placeholder 2">
+            <a:extLst>
+              <a:ext uri="{FF2B5EF4-FFF2-40B4-BE49-F238E27FC236}">
+                <a16:creationId xmlns:a16="http://schemas.microsoft.com/office/drawing/2014/main" id="{D4447A6D-6A7E-49F9-9FD9-7C16E6D15218}"/>
+              </a:ext>
+            </a:extLst>
+          </p:cNvPr>
+          <p:cNvSpPr>
+            <a:spLocks noGrp="1"/>
+          </p:cNvSpPr>
+          <p:nvPr>
+            <p:ph idx="1"/>
+          </p:nvPr>
+        </p:nvSpPr>
+        <p:spPr>
+          <a:xfrm>
+            <a:off x="5297762" y="2706624"/>
+            <a:ext cx="6251110" cy="3483864"/>
+          </a:xfrm>
+        </p:spPr>
+        <p:txBody>
+          <a:bodyPr>
+            <a:normAutofit/>
+          </a:bodyPr>
+          <a:lstStyle/>
+          <a:p>
+            <a:r>
+              <a:rPr lang="en-US" dirty="0"/>
+              <a:t>False is </a:t>
+            </a:r>
+            <a:r>
+              <a:rPr lang="en-US" dirty="0" err="1"/>
+              <a:t>easyish</a:t>
+            </a:r>
+            <a:endParaRPr lang="en-US" dirty="0"/>
+          </a:p>
+          <a:p>
+            <a:r>
+              <a:rPr lang="en-US" dirty="0"/>
+              <a:t>True is less easy</a:t>
+            </a:r>
+          </a:p>
+          <a:p>
+            <a:r>
+              <a:rPr lang="en-US" dirty="0"/>
+              <a:t>Anything else is hard</a:t>
+            </a:r>
+          </a:p>
+        </p:txBody>
+      </p:sp>
+      <p:pic>
+        <p:nvPicPr>
+          <p:cNvPr id="5" name="Picture 4">
+            <a:extLst>
+              <a:ext uri="{FF2B5EF4-FFF2-40B4-BE49-F238E27FC236}">
+                <a16:creationId xmlns:a16="http://schemas.microsoft.com/office/drawing/2014/main" id="{38B9E1BA-3FB8-4604-B68C-432B088ACC79}"/>
+              </a:ext>
+            </a:extLst>
+          </p:cNvPr>
+          <p:cNvPicPr>
+            <a:picLocks noChangeAspect="1"/>
+          </p:cNvPicPr>
+          <p:nvPr/>
+        </p:nvPicPr>
+        <p:blipFill rotWithShape="1">
+          <a:blip r:embed="rId2"/>
+          <a:srcRect l="24274" r="30395" b="-1"/>
+          <a:stretch/>
+        </p:blipFill>
+        <p:spPr>
+          <a:xfrm>
+            <a:off x="1" y="10"/>
+            <a:ext cx="4657344" cy="6857990"/>
+          </a:xfrm>
+          <a:custGeom>
+            <a:avLst/>
+            <a:gdLst/>
+            <a:ahLst/>
+            <a:cxnLst/>
+            <a:rect l="l" t="t" r="r" b="b"/>
+            <a:pathLst>
+              <a:path w="4657344" h="6858000">
+                <a:moveTo>
+                  <a:pt x="0" y="0"/>
+                </a:moveTo>
+                <a:lnTo>
+                  <a:pt x="3429755" y="0"/>
+                </a:lnTo>
+                <a:lnTo>
+                  <a:pt x="3526016" y="148742"/>
+                </a:lnTo>
+                <a:cubicBezTo>
+                  <a:pt x="3657740" y="365513"/>
+                  <a:pt x="3777402" y="589569"/>
+                  <a:pt x="3886489" y="819975"/>
+                </a:cubicBezTo>
+                <a:cubicBezTo>
+                  <a:pt x="3891856" y="833492"/>
+                  <a:pt x="3900663" y="845393"/>
+                  <a:pt x="3912049" y="854514"/>
+                </a:cubicBezTo>
+                <a:cubicBezTo>
+                  <a:pt x="3897352" y="819849"/>
+                  <a:pt x="3883037" y="784928"/>
+                  <a:pt x="3868083" y="750263"/>
+                </a:cubicBezTo>
+                <a:cubicBezTo>
+                  <a:pt x="3806989" y="608712"/>
+                  <a:pt x="3742478" y="469145"/>
+                  <a:pt x="3674155" y="331786"/>
+                </a:cubicBezTo>
+                <a:lnTo>
+                  <a:pt x="3496656" y="0"/>
+                </a:lnTo>
+                <a:lnTo>
+                  <a:pt x="3554371" y="0"/>
+                </a:lnTo>
+                <a:lnTo>
+                  <a:pt x="3661621" y="196614"/>
+                </a:lnTo>
+                <a:cubicBezTo>
+                  <a:pt x="3856899" y="573253"/>
+                  <a:pt x="4021071" y="966066"/>
+                  <a:pt x="4161279" y="1371196"/>
+                </a:cubicBezTo>
+                <a:cubicBezTo>
+                  <a:pt x="4379525" y="2007265"/>
+                  <a:pt x="4530141" y="2664286"/>
+                  <a:pt x="4610660" y="3331516"/>
+                </a:cubicBezTo>
+                <a:cubicBezTo>
+                  <a:pt x="4652837" y="3672965"/>
+                  <a:pt x="4671625" y="4013908"/>
+                  <a:pt x="4645040" y="4357388"/>
+                </a:cubicBezTo>
+                <a:cubicBezTo>
+                  <a:pt x="4613599" y="4758899"/>
+                  <a:pt x="4566181" y="5157998"/>
+                  <a:pt x="4485789" y="5552906"/>
+                </a:cubicBezTo>
+                <a:cubicBezTo>
+                  <a:pt x="4397121" y="5988893"/>
+                  <a:pt x="4276748" y="6414594"/>
+                  <a:pt x="4117769" y="6828295"/>
+                </a:cubicBezTo>
+                <a:lnTo>
+                  <a:pt x="4105288" y="6858000"/>
+                </a:lnTo>
+                <a:lnTo>
+                  <a:pt x="4052520" y="6858000"/>
+                </a:lnTo>
+                <a:lnTo>
+                  <a:pt x="4059369" y="6841549"/>
+                </a:lnTo>
+                <a:cubicBezTo>
+                  <a:pt x="4147276" y="6614016"/>
+                  <a:pt x="4224193" y="6380817"/>
+                  <a:pt x="4291518" y="6142729"/>
+                </a:cubicBezTo>
+                <a:cubicBezTo>
+                  <a:pt x="4350055" y="5935370"/>
+                  <a:pt x="4393256" y="5723695"/>
+                  <a:pt x="4443357" y="5513923"/>
+                </a:cubicBezTo>
+                <a:cubicBezTo>
+                  <a:pt x="4444541" y="5502788"/>
+                  <a:pt x="4445137" y="5491601"/>
+                  <a:pt x="4445146" y="5480401"/>
+                </a:cubicBezTo>
+                <a:cubicBezTo>
+                  <a:pt x="4408465" y="5607635"/>
+                  <a:pt x="4379196" y="5719759"/>
+                  <a:pt x="4344559" y="5830359"/>
+                </a:cubicBezTo>
+                <a:cubicBezTo>
+                  <a:pt x="4254261" y="6118381"/>
+                  <a:pt x="4150112" y="6398531"/>
+                  <a:pt x="4031702" y="6670527"/>
+                </a:cubicBezTo>
+                <a:lnTo>
+                  <a:pt x="3943824" y="6858000"/>
+                </a:lnTo>
+                <a:lnTo>
+                  <a:pt x="0" y="6858000"/>
+                </a:lnTo>
+                <a:close/>
+              </a:path>
+            </a:pathLst>
+          </a:custGeom>
+        </p:spPr>
+      </p:pic>
+    </p:spTree>
+    <p:extLst>
+      <p:ext uri="{BB962C8B-B14F-4D97-AF65-F5344CB8AC3E}">
+        <p14:creationId xmlns:p14="http://schemas.microsoft.com/office/powerpoint/2010/main" val="2674961052"/>
+      </p:ext>
+    </p:extLst>
+  </p:cSld>
+  <p:clrMapOvr>
+    <a:masterClrMapping/>
+  </p:clrMapOvr>
+</p:sld>
+</file>
+
+<file path=ppt/slides/slide5.xml><?xml version="1.0" encoding="utf-8"?>
+<p:sld xmlns:a="http://schemas.openxmlformats.org/drawingml/2006/main" xmlns:r="http://schemas.openxmlformats.org/officeDocument/2006/relationships" xmlns:p="http://schemas.openxmlformats.org/presentationml/2006/main">
+  <p:cSld>
+    <p:bg>
+      <p:bgPr>
+        <a:solidFill>
+          <a:schemeClr val="bg1"/>
+        </a:solidFill>
+        <a:effectLst/>
+      </p:bgPr>
+    </p:bg>
+    <p:spTree>
+      <p:nvGrpSpPr>
+        <p:cNvPr id="1" name=""/>
+        <p:cNvGrpSpPr/>
+        <p:nvPr/>
+      </p:nvGrpSpPr>
+      <p:grpSpPr>
+        <a:xfrm>
+          <a:off x="0" y="0"/>
+          <a:ext cx="0" cy="0"/>
+          <a:chOff x="0" y="0"/>
+          <a:chExt cx="0" cy="0"/>
+        </a:xfrm>
+      </p:grpSpPr>
+      <p:sp useBgFill="1">
+        <p:nvSpPr>
+          <p:cNvPr id="12" name="Rectangle 11">
+            <a:extLst>
+              <a:ext uri="{FF2B5EF4-FFF2-40B4-BE49-F238E27FC236}">
+                <a16:creationId xmlns:a16="http://schemas.microsoft.com/office/drawing/2014/main" id="{F13C74B1-5B17-4795-BED0-7140497B445A}"/>
+              </a:ext>
+              <a:ext uri="{C183D7F6-B498-43B3-948B-1728B52AA6E4}">
+                <adec:decorative xmlns:adec="http://schemas.microsoft.com/office/drawing/2017/decorative" val="1"/>
+              </a:ext>
+            </a:extLst>
+          </p:cNvPr>
+          <p:cNvSpPr>
+            <a:spLocks noGrp="1" noRot="1" noChangeAspect="1" noMove="1" noResize="1" noEditPoints="1" noAdjustHandles="1" noChangeArrowheads="1" noChangeShapeType="1" noTextEdit="1"/>
+          </p:cNvSpPr>
+          <p:nvPr>
+            <p:extLst>
+              <p:ext uri="{386F3935-93C4-4BCD-93E2-E3B085C9AB24}">
+                <p16:designElem xmlns:p16="http://schemas.microsoft.com/office/powerpoint/2015/main" val="1"/>
+              </p:ext>
+            </p:extLst>
+          </p:nvPr>
+        </p:nvSpPr>
+        <p:spPr>
+          <a:xfrm>
+            <a:off x="0" y="0"/>
+            <a:ext cx="12188952" cy="6858000"/>
+          </a:xfrm>
+          <a:prstGeom prst="rect">
+            <a:avLst/>
+          </a:prstGeom>
+          <a:ln>
+            <a:noFill/>
+          </a:ln>
+        </p:spPr>
+        <p:style>
+          <a:lnRef idx="2">
+            <a:schemeClr val="accent1">
+              <a:shade val="50000"/>
+            </a:schemeClr>
+          </a:lnRef>
+          <a:fillRef idx="1">
+            <a:schemeClr val="accent1"/>
+          </a:fillRef>
+          <a:effectRef idx="0">
+            <a:schemeClr val="accent1"/>
+          </a:effectRef>
+          <a:fontRef idx="minor">
+            <a:schemeClr val="lt1"/>
+          </a:fontRef>
+        </p:style>
+        <p:txBody>
+          <a:bodyPr rtlCol="0" anchor="ctr"/>
+          <a:lstStyle/>
+          <a:p>
+            <a:pPr algn="ctr"/>
+            <a:endParaRPr lang="en-US"/>
+          </a:p>
+        </p:txBody>
+      </p:sp>
+      <p:sp>
+        <p:nvSpPr>
+          <p:cNvPr id="2" name="Title 1">
+            <a:extLst>
+              <a:ext uri="{FF2B5EF4-FFF2-40B4-BE49-F238E27FC236}">
+                <a16:creationId xmlns:a16="http://schemas.microsoft.com/office/drawing/2014/main" id="{146D8000-12F0-41F9-BB17-FCA9930209F1}"/>
+              </a:ext>
+            </a:extLst>
+          </p:cNvPr>
+          <p:cNvSpPr>
+            <a:spLocks noGrp="1"/>
+          </p:cNvSpPr>
+          <p:nvPr>
+            <p:ph type="title"/>
+          </p:nvPr>
+        </p:nvSpPr>
+        <p:spPr>
+          <a:xfrm>
+            <a:off x="640080" y="325369"/>
+            <a:ext cx="4368602" cy="1956841"/>
+          </a:xfrm>
+        </p:spPr>
+        <p:txBody>
+          <a:bodyPr anchor="b">
+            <a:normAutofit/>
+          </a:bodyPr>
+          <a:lstStyle/>
+          <a:p>
+            <a:pPr>
+              <a:lnSpc>
+                <a:spcPct val="90000"/>
+              </a:lnSpc>
+            </a:pPr>
+            <a:r>
+              <a:rPr lang="en-US" sz="6600"/>
+              <a:t>What to do about it</a:t>
+            </a:r>
+          </a:p>
+        </p:txBody>
+      </p:sp>
+      <p:sp>
+        <p:nvSpPr>
+          <p:cNvPr id="14" name="Rectangle 6">
+            <a:extLst>
+              <a:ext uri="{FF2B5EF4-FFF2-40B4-BE49-F238E27FC236}">
+                <a16:creationId xmlns:a16="http://schemas.microsoft.com/office/drawing/2014/main" id="{3FCFB1DE-0B7E-48CC-BA90-B2AB0889F9D6}"/>
+              </a:ext>
+              <a:ext uri="{C183D7F6-B498-43B3-948B-1728B52AA6E4}">
+                <adec:decorative xmlns:adec="http://schemas.microsoft.com/office/drawing/2017/decorative" val="1"/>
+              </a:ext>
+            </a:extLst>
+          </p:cNvPr>
+          <p:cNvSpPr>
+            <a:spLocks noGrp="1" noRot="1" noChangeAspect="1" noMove="1" noResize="1" noEditPoints="1" noAdjustHandles="1" noChangeArrowheads="1" noChangeShapeType="1" noTextEdit="1"/>
+          </p:cNvSpPr>
+          <p:nvPr>
+            <p:extLst>
+              <p:ext uri="{386F3935-93C4-4BCD-93E2-E3B085C9AB24}">
+                <p16:designElem xmlns:p16="http://schemas.microsoft.com/office/powerpoint/2015/main" val="1"/>
+              </p:ext>
+            </p:extLst>
+          </p:nvPr>
+        </p:nvSpPr>
+        <p:spPr>
+          <a:xfrm>
+            <a:off x="765093" y="2563839"/>
+            <a:ext cx="3931920" cy="27432"/>
+          </a:xfrm>
+          <a:custGeom>
+            <a:avLst/>
+            <a:gdLst>
+              <a:gd name="connsiteX0" fmla="*/ 0 w 3931920"/>
+              <a:gd name="connsiteY0" fmla="*/ 0 h 27432"/>
+              <a:gd name="connsiteX1" fmla="*/ 733958 w 3931920"/>
+              <a:gd name="connsiteY1" fmla="*/ 0 h 27432"/>
+              <a:gd name="connsiteX2" fmla="*/ 1428598 w 3931920"/>
+              <a:gd name="connsiteY2" fmla="*/ 0 h 27432"/>
+              <a:gd name="connsiteX3" fmla="*/ 2123237 w 3931920"/>
+              <a:gd name="connsiteY3" fmla="*/ 0 h 27432"/>
+              <a:gd name="connsiteX4" fmla="*/ 2660599 w 3931920"/>
+              <a:gd name="connsiteY4" fmla="*/ 0 h 27432"/>
+              <a:gd name="connsiteX5" fmla="*/ 3237281 w 3931920"/>
+              <a:gd name="connsiteY5" fmla="*/ 0 h 27432"/>
+              <a:gd name="connsiteX6" fmla="*/ 3931920 w 3931920"/>
+              <a:gd name="connsiteY6" fmla="*/ 0 h 27432"/>
+              <a:gd name="connsiteX7" fmla="*/ 3931920 w 3931920"/>
+              <a:gd name="connsiteY7" fmla="*/ 27432 h 27432"/>
+              <a:gd name="connsiteX8" fmla="*/ 3276600 w 3931920"/>
+              <a:gd name="connsiteY8" fmla="*/ 27432 h 27432"/>
+              <a:gd name="connsiteX9" fmla="*/ 2739238 w 3931920"/>
+              <a:gd name="connsiteY9" fmla="*/ 27432 h 27432"/>
+              <a:gd name="connsiteX10" fmla="*/ 2201875 w 3931920"/>
+              <a:gd name="connsiteY10" fmla="*/ 27432 h 27432"/>
+              <a:gd name="connsiteX11" fmla="*/ 1507236 w 3931920"/>
+              <a:gd name="connsiteY11" fmla="*/ 27432 h 27432"/>
+              <a:gd name="connsiteX12" fmla="*/ 930554 w 3931920"/>
+              <a:gd name="connsiteY12" fmla="*/ 27432 h 27432"/>
+              <a:gd name="connsiteX13" fmla="*/ 0 w 3931920"/>
+              <a:gd name="connsiteY13" fmla="*/ 27432 h 27432"/>
+              <a:gd name="connsiteX14" fmla="*/ 0 w 3931920"/>
+              <a:gd name="connsiteY14" fmla="*/ 0 h 27432"/>
+            </a:gdLst>
+            <a:ahLst/>
+            <a:cxnLst>
+              <a:cxn ang="0">
+                <a:pos x="connsiteX0" y="connsiteY0"/>
+              </a:cxn>
+              <a:cxn ang="0">
+                <a:pos x="connsiteX1" y="connsiteY1"/>
+              </a:cxn>
+              <a:cxn ang="0">
+                <a:pos x="connsiteX2" y="connsiteY2"/>
+              </a:cxn>
+              <a:cxn ang="0">
+                <a:pos x="connsiteX3" y="connsiteY3"/>
+              </a:cxn>
+              <a:cxn ang="0">
+                <a:pos x="connsiteX4" y="connsiteY4"/>
+              </a:cxn>
+              <a:cxn ang="0">
+                <a:pos x="connsiteX5" y="connsiteY5"/>
+              </a:cxn>
+              <a:cxn ang="0">
+                <a:pos x="connsiteX6" y="connsiteY6"/>
+              </a:cxn>
+              <a:cxn ang="0">
+                <a:pos x="connsiteX7" y="connsiteY7"/>
+              </a:cxn>
+              <a:cxn ang="0">
+                <a:pos x="connsiteX8" y="connsiteY8"/>
+              </a:cxn>
+              <a:cxn ang="0">
+                <a:pos x="connsiteX9" y="connsiteY9"/>
+              </a:cxn>
+              <a:cxn ang="0">
+                <a:pos x="connsiteX10" y="connsiteY10"/>
+              </a:cxn>
+              <a:cxn ang="0">
+                <a:pos x="connsiteX11" y="connsiteY11"/>
+              </a:cxn>
+              <a:cxn ang="0">
+                <a:pos x="connsiteX12" y="connsiteY12"/>
+              </a:cxn>
+              <a:cxn ang="0">
+                <a:pos x="connsiteX13" y="connsiteY13"/>
+              </a:cxn>
+              <a:cxn ang="0">
+                <a:pos x="connsiteX14" y="connsiteY14"/>
+              </a:cxn>
+            </a:cxnLst>
+            <a:rect l="l" t="t" r="r" b="b"/>
+            <a:pathLst>
+              <a:path w="3931920" h="27432" fill="none" extrusionOk="0">
+                <a:moveTo>
+                  <a:pt x="0" y="0"/>
+                </a:moveTo>
+                <a:cubicBezTo>
+                  <a:pt x="245351" y="16874"/>
+                  <a:pt x="509174" y="13736"/>
+                  <a:pt x="733958" y="0"/>
+                </a:cubicBezTo>
+                <a:cubicBezTo>
+                  <a:pt x="958742" y="-13736"/>
+                  <a:pt x="1245406" y="-17215"/>
+                  <a:pt x="1428598" y="0"/>
+                </a:cubicBezTo>
+                <a:cubicBezTo>
+                  <a:pt x="1611790" y="17215"/>
+                  <a:pt x="1930525" y="20562"/>
+                  <a:pt x="2123237" y="0"/>
+                </a:cubicBezTo>
+                <a:cubicBezTo>
+                  <a:pt x="2315949" y="-20562"/>
+                  <a:pt x="2485508" y="11332"/>
+                  <a:pt x="2660599" y="0"/>
+                </a:cubicBezTo>
+                <a:cubicBezTo>
+                  <a:pt x="2835690" y="-11332"/>
+                  <a:pt x="3075198" y="-14809"/>
+                  <a:pt x="3237281" y="0"/>
+                </a:cubicBezTo>
+                <a:cubicBezTo>
+                  <a:pt x="3399364" y="14809"/>
+                  <a:pt x="3745084" y="-4992"/>
+                  <a:pt x="3931920" y="0"/>
+                </a:cubicBezTo>
+                <a:cubicBezTo>
+                  <a:pt x="3930963" y="8431"/>
+                  <a:pt x="3931571" y="14612"/>
+                  <a:pt x="3931920" y="27432"/>
+                </a:cubicBezTo>
+                <a:cubicBezTo>
+                  <a:pt x="3765435" y="40792"/>
+                  <a:pt x="3452398" y="38703"/>
+                  <a:pt x="3276600" y="27432"/>
+                </a:cubicBezTo>
+                <a:cubicBezTo>
+                  <a:pt x="3100802" y="16161"/>
+                  <a:pt x="2914889" y="26998"/>
+                  <a:pt x="2739238" y="27432"/>
+                </a:cubicBezTo>
+                <a:cubicBezTo>
+                  <a:pt x="2563587" y="27866"/>
+                  <a:pt x="2395484" y="39154"/>
+                  <a:pt x="2201875" y="27432"/>
+                </a:cubicBezTo>
+                <a:cubicBezTo>
+                  <a:pt x="2008266" y="15710"/>
+                  <a:pt x="1781367" y="4899"/>
+                  <a:pt x="1507236" y="27432"/>
+                </a:cubicBezTo>
+                <a:cubicBezTo>
+                  <a:pt x="1233105" y="49965"/>
+                  <a:pt x="1075495" y="47542"/>
+                  <a:pt x="930554" y="27432"/>
+                </a:cubicBezTo>
+                <a:cubicBezTo>
+                  <a:pt x="785613" y="7322"/>
+                  <a:pt x="268930" y="30433"/>
+                  <a:pt x="0" y="27432"/>
+                </a:cubicBezTo>
+                <a:cubicBezTo>
+                  <a:pt x="226" y="18208"/>
+                  <a:pt x="-648" y="12891"/>
+                  <a:pt x="0" y="0"/>
+                </a:cubicBezTo>
+                <a:close/>
+              </a:path>
+              <a:path w="3931920" h="27432" stroke="0" extrusionOk="0">
+                <a:moveTo>
+                  <a:pt x="0" y="0"/>
+                </a:moveTo>
+                <a:cubicBezTo>
+                  <a:pt x="278269" y="4786"/>
+                  <a:pt x="349028" y="-10422"/>
+                  <a:pt x="616001" y="0"/>
+                </a:cubicBezTo>
+                <a:cubicBezTo>
+                  <a:pt x="882974" y="10422"/>
+                  <a:pt x="931617" y="-15515"/>
+                  <a:pt x="1153363" y="0"/>
+                </a:cubicBezTo>
+                <a:cubicBezTo>
+                  <a:pt x="1375109" y="15515"/>
+                  <a:pt x="1704089" y="-3631"/>
+                  <a:pt x="1887322" y="0"/>
+                </a:cubicBezTo>
+                <a:cubicBezTo>
+                  <a:pt x="2070555" y="3631"/>
+                  <a:pt x="2344155" y="2213"/>
+                  <a:pt x="2503322" y="0"/>
+                </a:cubicBezTo>
+                <a:cubicBezTo>
+                  <a:pt x="2662489" y="-2213"/>
+                  <a:pt x="2976859" y="26691"/>
+                  <a:pt x="3119323" y="0"/>
+                </a:cubicBezTo>
+                <a:cubicBezTo>
+                  <a:pt x="3261787" y="-26691"/>
+                  <a:pt x="3588171" y="-28651"/>
+                  <a:pt x="3931920" y="0"/>
+                </a:cubicBezTo>
+                <a:cubicBezTo>
+                  <a:pt x="3930565" y="9524"/>
+                  <a:pt x="3930718" y="13975"/>
+                  <a:pt x="3931920" y="27432"/>
+                </a:cubicBezTo>
+                <a:cubicBezTo>
+                  <a:pt x="3664329" y="4021"/>
+                  <a:pt x="3437686" y="14511"/>
+                  <a:pt x="3276600" y="27432"/>
+                </a:cubicBezTo>
+                <a:cubicBezTo>
+                  <a:pt x="3115514" y="40353"/>
+                  <a:pt x="2913592" y="48967"/>
+                  <a:pt x="2739238" y="27432"/>
+                </a:cubicBezTo>
+                <a:cubicBezTo>
+                  <a:pt x="2564884" y="5897"/>
+                  <a:pt x="2294049" y="39820"/>
+                  <a:pt x="2083918" y="27432"/>
+                </a:cubicBezTo>
+                <a:cubicBezTo>
+                  <a:pt x="1873787" y="15044"/>
+                  <a:pt x="1718903" y="21388"/>
+                  <a:pt x="1428598" y="27432"/>
+                </a:cubicBezTo>
+                <a:cubicBezTo>
+                  <a:pt x="1138293" y="33476"/>
+                  <a:pt x="952209" y="50441"/>
+                  <a:pt x="812597" y="27432"/>
+                </a:cubicBezTo>
+                <a:cubicBezTo>
+                  <a:pt x="672985" y="4423"/>
+                  <a:pt x="305800" y="28240"/>
+                  <a:pt x="0" y="27432"/>
+                </a:cubicBezTo>
+                <a:cubicBezTo>
+                  <a:pt x="-800" y="16780"/>
+                  <a:pt x="-583" y="12910"/>
+                  <a:pt x="0" y="0"/>
+                </a:cubicBezTo>
+                <a:close/>
+              </a:path>
+            </a:pathLst>
+          </a:custGeom>
+          <a:solidFill>
+            <a:srgbClr val="E46696"/>
+          </a:solidFill>
+          <a:ln w="38100" cap="rnd">
+            <a:solidFill>
+              <a:srgbClr val="E46696"/>
+            </a:solidFill>
+            <a:round/>
+            <a:extLst>
+              <a:ext uri="{C807C97D-BFC1-408E-A445-0C87EB9F89A2}">
+                <ask:lineSketchStyleProps xmlns:ask="http://schemas.microsoft.com/office/drawing/2018/sketchyshapes" sd="1219033472">
+                  <a:prstGeom prst="rect">
+                    <a:avLst/>
+                  </a:prstGeom>
+                  <ask:type>
+                    <ask:lineSketchFreehand/>
+                  </ask:type>
+                </ask:lineSketchStyleProps>
+              </a:ext>
+            </a:extLst>
+          </a:ln>
+        </p:spPr>
+        <p:style>
+          <a:lnRef idx="2">
+            <a:schemeClr val="accent1">
+              <a:shade val="50000"/>
+            </a:schemeClr>
+          </a:lnRef>
+          <a:fillRef idx="1">
+            <a:schemeClr val="accent1"/>
+          </a:fillRef>
+          <a:effectRef idx="0">
+            <a:schemeClr val="accent1"/>
+          </a:effectRef>
+          <a:fontRef idx="minor">
+            <a:schemeClr val="lt1"/>
+          </a:fontRef>
+        </p:style>
+        <p:txBody>
+          <a:bodyPr rtlCol="0" anchor="ctr"/>
+          <a:lstStyle/>
+          <a:p>
+            <a:pPr algn="ctr"/>
+            <a:endParaRPr lang="en-US"/>
+          </a:p>
+        </p:txBody>
+      </p:sp>
+      <p:sp>
+        <p:nvSpPr>
+          <p:cNvPr id="9" name="Content Placeholder 8">
+            <a:extLst>
+              <a:ext uri="{FF2B5EF4-FFF2-40B4-BE49-F238E27FC236}">
+                <a16:creationId xmlns:a16="http://schemas.microsoft.com/office/drawing/2014/main" id="{F30D4082-C655-4F88-A4C2-7C0536FA074E}"/>
+              </a:ext>
+            </a:extLst>
+          </p:cNvPr>
+          <p:cNvSpPr>
+            <a:spLocks noGrp="1"/>
+          </p:cNvSpPr>
+          <p:nvPr>
+            <p:ph idx="1"/>
+          </p:nvPr>
+        </p:nvSpPr>
+        <p:spPr>
+          <a:xfrm>
+            <a:off x="640080" y="2872899"/>
+            <a:ext cx="4243589" cy="3320668"/>
+          </a:xfrm>
+        </p:spPr>
+        <p:txBody>
+          <a:bodyPr>
+            <a:normAutofit/>
+          </a:bodyPr>
+          <a:lstStyle/>
+          <a:p>
+            <a:endParaRPr lang="en-US"/>
+          </a:p>
+        </p:txBody>
+      </p:sp>
+      <p:pic>
+        <p:nvPicPr>
+          <p:cNvPr id="5" name="Content Placeholder 4" descr="City lights focused in magnifying glass">
+            <a:extLst>
+              <a:ext uri="{FF2B5EF4-FFF2-40B4-BE49-F238E27FC236}">
+                <a16:creationId xmlns:a16="http://schemas.microsoft.com/office/drawing/2014/main" id="{6ED14EC7-9708-4199-8AE8-2B4C8A004ACC}"/>
+              </a:ext>
+            </a:extLst>
+          </p:cNvPr>
+          <p:cNvPicPr>
+            <a:picLocks noChangeAspect="1"/>
+          </p:cNvPicPr>
+          <p:nvPr/>
+        </p:nvPicPr>
+        <p:blipFill rotWithShape="1">
+          <a:blip r:embed="rId2">
+            <a:extLst>
+              <a:ext uri="{28A0092B-C50C-407E-A947-70E740481C1C}">
+                <a14:useLocalDpi xmlns:a14="http://schemas.microsoft.com/office/drawing/2010/main" val="0"/>
+              </a:ext>
+            </a:extLst>
+          </a:blip>
+          <a:srcRect l="16771" r="16275" b="-1"/>
+          <a:stretch/>
+        </p:blipFill>
+        <p:spPr>
+          <a:xfrm>
+            <a:off x="5311702" y="10"/>
+            <a:ext cx="6878775" cy="6857990"/>
+          </a:xfrm>
+          <a:custGeom>
+            <a:avLst/>
+            <a:gdLst/>
+            <a:ahLst/>
+            <a:cxnLst/>
+            <a:rect l="l" t="t" r="r" b="b"/>
+            <a:pathLst>
+              <a:path w="6878775" h="6858000">
+                <a:moveTo>
+                  <a:pt x="1102973" y="0"/>
+                </a:moveTo>
+                <a:lnTo>
+                  <a:pt x="1160688" y="0"/>
+                </a:lnTo>
+                <a:lnTo>
+                  <a:pt x="983189" y="331786"/>
+                </a:lnTo>
+                <a:cubicBezTo>
+                  <a:pt x="914866" y="469145"/>
+                  <a:pt x="850355" y="608712"/>
+                  <a:pt x="789261" y="750263"/>
+                </a:cubicBezTo>
+                <a:cubicBezTo>
+                  <a:pt x="774307" y="784928"/>
+                  <a:pt x="759992" y="819849"/>
+                  <a:pt x="745295" y="854514"/>
+                </a:cubicBezTo>
+                <a:cubicBezTo>
+                  <a:pt x="756682" y="845393"/>
+                  <a:pt x="765489" y="833492"/>
+                  <a:pt x="770857" y="819975"/>
+                </a:cubicBezTo>
+                <a:cubicBezTo>
+                  <a:pt x="879943" y="589569"/>
+                  <a:pt x="999605" y="365513"/>
+                  <a:pt x="1131329" y="148742"/>
+                </a:cubicBezTo>
+                <a:lnTo>
+                  <a:pt x="1227589" y="0"/>
+                </a:lnTo>
+                <a:lnTo>
+                  <a:pt x="6878775" y="0"/>
+                </a:lnTo>
+                <a:lnTo>
+                  <a:pt x="6878775" y="6858000"/>
+                </a:lnTo>
+                <a:lnTo>
+                  <a:pt x="713521" y="6858000"/>
+                </a:lnTo>
+                <a:lnTo>
+                  <a:pt x="625642" y="6670527"/>
+                </a:lnTo>
+                <a:cubicBezTo>
+                  <a:pt x="507232" y="6398531"/>
+                  <a:pt x="403083" y="6118381"/>
+                  <a:pt x="312785" y="5830359"/>
+                </a:cubicBezTo>
+                <a:cubicBezTo>
+                  <a:pt x="278149" y="5719759"/>
+                  <a:pt x="248879" y="5607635"/>
+                  <a:pt x="212198" y="5480401"/>
+                </a:cubicBezTo>
+                <a:cubicBezTo>
+                  <a:pt x="212208" y="5491601"/>
+                  <a:pt x="212803" y="5502788"/>
+                  <a:pt x="213988" y="5513923"/>
+                </a:cubicBezTo>
+                <a:cubicBezTo>
+                  <a:pt x="264089" y="5723695"/>
+                  <a:pt x="307290" y="5935370"/>
+                  <a:pt x="365826" y="6142729"/>
+                </a:cubicBezTo>
+                <a:cubicBezTo>
+                  <a:pt x="433152" y="6380817"/>
+                  <a:pt x="510068" y="6614016"/>
+                  <a:pt x="597975" y="6841549"/>
+                </a:cubicBezTo>
+                <a:lnTo>
+                  <a:pt x="604824" y="6858000"/>
+                </a:lnTo>
+                <a:lnTo>
+                  <a:pt x="552056" y="6858000"/>
+                </a:lnTo>
+                <a:lnTo>
+                  <a:pt x="539576" y="6828295"/>
+                </a:lnTo>
+                <a:cubicBezTo>
+                  <a:pt x="380597" y="6414594"/>
+                  <a:pt x="260223" y="5988893"/>
+                  <a:pt x="171555" y="5552906"/>
+                </a:cubicBezTo>
+                <a:cubicBezTo>
+                  <a:pt x="91163" y="5157998"/>
+                  <a:pt x="43746" y="4758899"/>
+                  <a:pt x="12305" y="4357388"/>
+                </a:cubicBezTo>
+                <a:cubicBezTo>
+                  <a:pt x="-14281" y="4013908"/>
+                  <a:pt x="4507" y="3672965"/>
+                  <a:pt x="46684" y="3331516"/>
+                </a:cubicBezTo>
+                <a:cubicBezTo>
+                  <a:pt x="127203" y="2664286"/>
+                  <a:pt x="277819" y="2007265"/>
+                  <a:pt x="496065" y="1371196"/>
+                </a:cubicBezTo>
+                <a:cubicBezTo>
+                  <a:pt x="636273" y="966066"/>
+                  <a:pt x="800445" y="573253"/>
+                  <a:pt x="995723" y="196614"/>
+                </a:cubicBezTo>
+                <a:close/>
+              </a:path>
+            </a:pathLst>
+          </a:custGeom>
+        </p:spPr>
+      </p:pic>
+    </p:spTree>
+    <p:extLst>
+      <p:ext uri="{BB962C8B-B14F-4D97-AF65-F5344CB8AC3E}">
+        <p14:creationId xmlns:p14="http://schemas.microsoft.com/office/powerpoint/2010/main" val="1859402302"/>
+      </p:ext>
+    </p:extLst>
+  </p:cSld>
+  <p:clrMapOvr>
+    <a:masterClrMapping/>
+  </p:clrMapOvr>
+</p:sld>
+</file>
+
+<file path=ppt/slides/slide6.xml><?xml version="1.0" encoding="utf-8"?>
+<p:sld xmlns:a="http://schemas.openxmlformats.org/drawingml/2006/main" xmlns:r="http://schemas.openxmlformats.org/officeDocument/2006/relationships" xmlns:p="http://schemas.openxmlformats.org/presentationml/2006/main">
+  <p:cSld>
+    <p:bg>
+      <p:bgPr>
+        <a:solidFill>
+          <a:schemeClr val="bg1"/>
+        </a:solidFill>
+        <a:effectLst/>
+      </p:bgPr>
+    </p:bg>
+    <p:spTree>
+      <p:nvGrpSpPr>
+        <p:cNvPr id="1" name=""/>
+        <p:cNvGrpSpPr/>
+        <p:nvPr/>
+      </p:nvGrpSpPr>
+      <p:grpSpPr>
+        <a:xfrm>
+          <a:off x="0" y="0"/>
+          <a:ext cx="0" cy="0"/>
+          <a:chOff x="0" y="0"/>
+          <a:chExt cx="0" cy="0"/>
+        </a:xfrm>
+      </p:grpSpPr>
+      <p:sp useBgFill="1">
+        <p:nvSpPr>
+          <p:cNvPr id="9" name="Rectangle 8">
+            <a:extLst>
+              <a:ext uri="{FF2B5EF4-FFF2-40B4-BE49-F238E27FC236}">
+                <a16:creationId xmlns:a16="http://schemas.microsoft.com/office/drawing/2014/main" id="{2C61293E-6EBE-43EF-A52C-9BEBFD7679D4}"/>
+              </a:ext>
+              <a:ext uri="{C183D7F6-B498-43B3-948B-1728B52AA6E4}">
+                <adec:decorative xmlns:adec="http://schemas.microsoft.com/office/drawing/2017/decorative" val="1"/>
+              </a:ext>
+            </a:extLst>
+          </p:cNvPr>
+          <p:cNvSpPr>
+            <a:spLocks noGrp="1" noRot="1" noChangeAspect="1" noMove="1" noResize="1" noEditPoints="1" noAdjustHandles="1" noChangeArrowheads="1" noChangeShapeType="1" noTextEdit="1"/>
+          </p:cNvSpPr>
+          <p:nvPr>
+            <p:extLst>
+              <p:ext uri="{386F3935-93C4-4BCD-93E2-E3B085C9AB24}">
+                <p16:designElem xmlns:p16="http://schemas.microsoft.com/office/powerpoint/2015/main" val="1"/>
+              </p:ext>
+            </p:extLst>
+          </p:nvPr>
+        </p:nvSpPr>
+        <p:spPr>
+          <a:xfrm>
+            <a:off x="0" y="0"/>
+            <a:ext cx="12188952" cy="6858000"/>
+          </a:xfrm>
+          <a:prstGeom prst="rect">
+            <a:avLst/>
+          </a:prstGeom>
+          <a:ln>
+            <a:noFill/>
+          </a:ln>
+        </p:spPr>
+        <p:style>
+          <a:lnRef idx="2">
+            <a:schemeClr val="accent1">
+              <a:shade val="50000"/>
+            </a:schemeClr>
+          </a:lnRef>
+          <a:fillRef idx="1">
+            <a:schemeClr val="accent1"/>
+          </a:fillRef>
+          <a:effectRef idx="0">
+            <a:schemeClr val="accent1"/>
+          </a:effectRef>
+          <a:fontRef idx="minor">
+            <a:schemeClr val="lt1"/>
+          </a:fontRef>
+        </p:style>
+        <p:txBody>
+          <a:bodyPr rtlCol="0" anchor="ctr"/>
+          <a:lstStyle/>
+          <a:p>
+            <a:pPr algn="ctr"/>
+            <a:endParaRPr lang="en-US"/>
+          </a:p>
+        </p:txBody>
+      </p:sp>
+      <p:sp>
+        <p:nvSpPr>
+          <p:cNvPr id="2" name="Title 1">
+            <a:extLst>
+              <a:ext uri="{FF2B5EF4-FFF2-40B4-BE49-F238E27FC236}">
+                <a16:creationId xmlns:a16="http://schemas.microsoft.com/office/drawing/2014/main" id="{71E54A4C-27C8-425E-8D48-B9444171A947}"/>
+              </a:ext>
+            </a:extLst>
+          </p:cNvPr>
+          <p:cNvSpPr>
+            <a:spLocks noGrp="1"/>
+          </p:cNvSpPr>
+          <p:nvPr>
+            <p:ph type="title"/>
+          </p:nvPr>
+        </p:nvSpPr>
+        <p:spPr>
+          <a:xfrm>
+            <a:off x="5297762" y="329184"/>
+            <a:ext cx="6251110" cy="1783080"/>
+          </a:xfrm>
+        </p:spPr>
+        <p:txBody>
+          <a:bodyPr anchor="b">
+            <a:normAutofit/>
+          </a:bodyPr>
+          <a:lstStyle/>
+          <a:p>
+            <a:r>
+              <a:rPr lang="en-US" sz="7200"/>
+              <a:t>Future Work</a:t>
+            </a:r>
+          </a:p>
+        </p:txBody>
+      </p:sp>
+      <p:sp>
+        <p:nvSpPr>
+          <p:cNvPr id="11" name="Rectangle 6">
+            <a:extLst>
+              <a:ext uri="{FF2B5EF4-FFF2-40B4-BE49-F238E27FC236}">
+                <a16:creationId xmlns:a16="http://schemas.microsoft.com/office/drawing/2014/main" id="{3FCFB1DE-0B7E-48CC-BA90-B2AB0889F9D6}"/>
+              </a:ext>
+              <a:ext uri="{C183D7F6-B498-43B3-948B-1728B52AA6E4}">
+                <adec:decorative xmlns:adec="http://schemas.microsoft.com/office/drawing/2017/decorative" val="1"/>
+              </a:ext>
+            </a:extLst>
+          </p:cNvPr>
+          <p:cNvSpPr>
+            <a:spLocks noGrp="1" noRot="1" noChangeAspect="1" noMove="1" noResize="1" noEditPoints="1" noAdjustHandles="1" noChangeArrowheads="1" noChangeShapeType="1" noTextEdit="1"/>
+          </p:cNvSpPr>
+          <p:nvPr>
+            <p:extLst>
+              <p:ext uri="{386F3935-93C4-4BCD-93E2-E3B085C9AB24}">
+                <p16:designElem xmlns:p16="http://schemas.microsoft.com/office/powerpoint/2015/main" val="1"/>
+              </p:ext>
+            </p:extLst>
+          </p:nvPr>
+        </p:nvSpPr>
+        <p:spPr>
+          <a:xfrm>
+            <a:off x="5412862" y="2395728"/>
+            <a:ext cx="4243589" cy="27432"/>
+          </a:xfrm>
+          <a:custGeom>
+            <a:avLst/>
+            <a:gdLst>
+              <a:gd name="connsiteX0" fmla="*/ 0 w 4243589"/>
+              <a:gd name="connsiteY0" fmla="*/ 0 h 27432"/>
+              <a:gd name="connsiteX1" fmla="*/ 563791 w 4243589"/>
+              <a:gd name="connsiteY1" fmla="*/ 0 h 27432"/>
+              <a:gd name="connsiteX2" fmla="*/ 1042710 w 4243589"/>
+              <a:gd name="connsiteY2" fmla="*/ 0 h 27432"/>
+              <a:gd name="connsiteX3" fmla="*/ 1564066 w 4243589"/>
+              <a:gd name="connsiteY3" fmla="*/ 0 h 27432"/>
+              <a:gd name="connsiteX4" fmla="*/ 2212729 w 4243589"/>
+              <a:gd name="connsiteY4" fmla="*/ 0 h 27432"/>
+              <a:gd name="connsiteX5" fmla="*/ 2776520 w 4243589"/>
+              <a:gd name="connsiteY5" fmla="*/ 0 h 27432"/>
+              <a:gd name="connsiteX6" fmla="*/ 3297875 w 4243589"/>
+              <a:gd name="connsiteY6" fmla="*/ 0 h 27432"/>
+              <a:gd name="connsiteX7" fmla="*/ 4243589 w 4243589"/>
+              <a:gd name="connsiteY7" fmla="*/ 0 h 27432"/>
+              <a:gd name="connsiteX8" fmla="*/ 4243589 w 4243589"/>
+              <a:gd name="connsiteY8" fmla="*/ 27432 h 27432"/>
+              <a:gd name="connsiteX9" fmla="*/ 3637362 w 4243589"/>
+              <a:gd name="connsiteY9" fmla="*/ 27432 h 27432"/>
+              <a:gd name="connsiteX10" fmla="*/ 3116007 w 4243589"/>
+              <a:gd name="connsiteY10" fmla="*/ 27432 h 27432"/>
+              <a:gd name="connsiteX11" fmla="*/ 2424908 w 4243589"/>
+              <a:gd name="connsiteY11" fmla="*/ 27432 h 27432"/>
+              <a:gd name="connsiteX12" fmla="*/ 1861117 w 4243589"/>
+              <a:gd name="connsiteY12" fmla="*/ 27432 h 27432"/>
+              <a:gd name="connsiteX13" fmla="*/ 1382198 w 4243589"/>
+              <a:gd name="connsiteY13" fmla="*/ 27432 h 27432"/>
+              <a:gd name="connsiteX14" fmla="*/ 733535 w 4243589"/>
+              <a:gd name="connsiteY14" fmla="*/ 27432 h 27432"/>
+              <a:gd name="connsiteX15" fmla="*/ 0 w 4243589"/>
+              <a:gd name="connsiteY15" fmla="*/ 27432 h 27432"/>
+              <a:gd name="connsiteX16" fmla="*/ 0 w 4243589"/>
+              <a:gd name="connsiteY16" fmla="*/ 0 h 27432"/>
+            </a:gdLst>
+            <a:ahLst/>
+            <a:cxnLst>
+              <a:cxn ang="0">
+                <a:pos x="connsiteX0" y="connsiteY0"/>
+              </a:cxn>
+              <a:cxn ang="0">
+                <a:pos x="connsiteX1" y="connsiteY1"/>
+              </a:cxn>
+              <a:cxn ang="0">
+                <a:pos x="connsiteX2" y="connsiteY2"/>
+              </a:cxn>
+              <a:cxn ang="0">
+                <a:pos x="connsiteX3" y="connsiteY3"/>
+              </a:cxn>
+              <a:cxn ang="0">
+                <a:pos x="connsiteX4" y="connsiteY4"/>
+              </a:cxn>
+              <a:cxn ang="0">
+                <a:pos x="connsiteX5" y="connsiteY5"/>
+              </a:cxn>
+              <a:cxn ang="0">
+                <a:pos x="connsiteX6" y="connsiteY6"/>
+              </a:cxn>
+              <a:cxn ang="0">
+                <a:pos x="connsiteX7" y="connsiteY7"/>
+              </a:cxn>
+              <a:cxn ang="0">
+                <a:pos x="connsiteX8" y="connsiteY8"/>
+              </a:cxn>
+              <a:cxn ang="0">
+                <a:pos x="connsiteX9" y="connsiteY9"/>
+              </a:cxn>
+              <a:cxn ang="0">
+                <a:pos x="connsiteX10" y="connsiteY10"/>
+              </a:cxn>
+              <a:cxn ang="0">
+                <a:pos x="connsiteX11" y="connsiteY11"/>
+              </a:cxn>
+              <a:cxn ang="0">
+                <a:pos x="connsiteX12" y="connsiteY12"/>
+              </a:cxn>
+              <a:cxn ang="0">
+                <a:pos x="connsiteX13" y="connsiteY13"/>
+              </a:cxn>
+              <a:cxn ang="0">
+                <a:pos x="connsiteX14" y="connsiteY14"/>
+              </a:cxn>
+              <a:cxn ang="0">
+                <a:pos x="connsiteX15" y="connsiteY15"/>
+              </a:cxn>
+              <a:cxn ang="0">
+                <a:pos x="connsiteX16" y="connsiteY16"/>
+              </a:cxn>
+            </a:cxnLst>
+            <a:rect l="l" t="t" r="r" b="b"/>
+            <a:pathLst>
+              <a:path w="4243589" h="27432" fill="none" extrusionOk="0">
+                <a:moveTo>
+                  <a:pt x="0" y="0"/>
+                </a:moveTo>
+                <a:cubicBezTo>
+                  <a:pt x="157351" y="-15653"/>
+                  <a:pt x="378877" y="-5828"/>
+                  <a:pt x="563791" y="0"/>
+                </a:cubicBezTo>
+                <a:cubicBezTo>
+                  <a:pt x="748705" y="5828"/>
+                  <a:pt x="905659" y="-5525"/>
+                  <a:pt x="1042710" y="0"/>
+                </a:cubicBezTo>
+                <a:cubicBezTo>
+                  <a:pt x="1179761" y="5525"/>
+                  <a:pt x="1356845" y="-21288"/>
+                  <a:pt x="1564066" y="0"/>
+                </a:cubicBezTo>
+                <a:cubicBezTo>
+                  <a:pt x="1771287" y="21288"/>
+                  <a:pt x="1912099" y="25135"/>
+                  <a:pt x="2212729" y="0"/>
+                </a:cubicBezTo>
+                <a:cubicBezTo>
+                  <a:pt x="2513359" y="-25135"/>
+                  <a:pt x="2514918" y="-27119"/>
+                  <a:pt x="2776520" y="0"/>
+                </a:cubicBezTo>
+                <a:cubicBezTo>
+                  <a:pt x="3038122" y="27119"/>
+                  <a:pt x="3178771" y="18116"/>
+                  <a:pt x="3297875" y="0"/>
+                </a:cubicBezTo>
+                <a:cubicBezTo>
+                  <a:pt x="3416980" y="-18116"/>
+                  <a:pt x="4012240" y="-40869"/>
+                  <a:pt x="4243589" y="0"/>
+                </a:cubicBezTo>
+                <a:cubicBezTo>
+                  <a:pt x="4242616" y="8304"/>
+                  <a:pt x="4243111" y="21512"/>
+                  <a:pt x="4243589" y="27432"/>
+                </a:cubicBezTo>
+                <a:cubicBezTo>
+                  <a:pt x="4112949" y="6289"/>
+                  <a:pt x="3928037" y="10975"/>
+                  <a:pt x="3637362" y="27432"/>
+                </a:cubicBezTo>
+                <a:cubicBezTo>
+                  <a:pt x="3346687" y="43889"/>
+                  <a:pt x="3254446" y="35813"/>
+                  <a:pt x="3116007" y="27432"/>
+                </a:cubicBezTo>
+                <a:cubicBezTo>
+                  <a:pt x="2977569" y="19051"/>
+                  <a:pt x="2620228" y="38017"/>
+                  <a:pt x="2424908" y="27432"/>
+                </a:cubicBezTo>
+                <a:cubicBezTo>
+                  <a:pt x="2229588" y="16847"/>
+                  <a:pt x="2088287" y="5290"/>
+                  <a:pt x="1861117" y="27432"/>
+                </a:cubicBezTo>
+                <a:cubicBezTo>
+                  <a:pt x="1633947" y="49574"/>
+                  <a:pt x="1502447" y="8273"/>
+                  <a:pt x="1382198" y="27432"/>
+                </a:cubicBezTo>
+                <a:cubicBezTo>
+                  <a:pt x="1261949" y="46591"/>
+                  <a:pt x="1045440" y="37497"/>
+                  <a:pt x="733535" y="27432"/>
+                </a:cubicBezTo>
+                <a:cubicBezTo>
+                  <a:pt x="421630" y="17367"/>
+                  <a:pt x="341257" y="-9215"/>
+                  <a:pt x="0" y="27432"/>
+                </a:cubicBezTo>
+                <a:cubicBezTo>
+                  <a:pt x="-1048" y="14992"/>
+                  <a:pt x="-1120" y="7447"/>
+                  <a:pt x="0" y="0"/>
+                </a:cubicBezTo>
+                <a:close/>
+              </a:path>
+              <a:path w="4243589" h="27432" stroke="0" extrusionOk="0">
+                <a:moveTo>
+                  <a:pt x="0" y="0"/>
+                </a:moveTo>
+                <a:cubicBezTo>
+                  <a:pt x="128164" y="17204"/>
+                  <a:pt x="312653" y="1129"/>
+                  <a:pt x="563791" y="0"/>
+                </a:cubicBezTo>
+                <a:cubicBezTo>
+                  <a:pt x="814929" y="-1129"/>
+                  <a:pt x="837271" y="8503"/>
+                  <a:pt x="1042710" y="0"/>
+                </a:cubicBezTo>
+                <a:cubicBezTo>
+                  <a:pt x="1248149" y="-8503"/>
+                  <a:pt x="1588432" y="-28862"/>
+                  <a:pt x="1733809" y="0"/>
+                </a:cubicBezTo>
+                <a:cubicBezTo>
+                  <a:pt x="1879186" y="28862"/>
+                  <a:pt x="2052815" y="5974"/>
+                  <a:pt x="2297600" y="0"/>
+                </a:cubicBezTo>
+                <a:cubicBezTo>
+                  <a:pt x="2542385" y="-5974"/>
+                  <a:pt x="2699960" y="-23550"/>
+                  <a:pt x="2861391" y="0"/>
+                </a:cubicBezTo>
+                <a:cubicBezTo>
+                  <a:pt x="3022822" y="23550"/>
+                  <a:pt x="3390411" y="25272"/>
+                  <a:pt x="3552490" y="0"/>
+                </a:cubicBezTo>
+                <a:cubicBezTo>
+                  <a:pt x="3714569" y="-25272"/>
+                  <a:pt x="3950585" y="-31327"/>
+                  <a:pt x="4243589" y="0"/>
+                </a:cubicBezTo>
+                <a:cubicBezTo>
+                  <a:pt x="4244074" y="9333"/>
+                  <a:pt x="4244867" y="19699"/>
+                  <a:pt x="4243589" y="27432"/>
+                </a:cubicBezTo>
+                <a:cubicBezTo>
+                  <a:pt x="4130424" y="7904"/>
+                  <a:pt x="3932803" y="51393"/>
+                  <a:pt x="3722234" y="27432"/>
+                </a:cubicBezTo>
+                <a:cubicBezTo>
+                  <a:pt x="3511665" y="3471"/>
+                  <a:pt x="3269903" y="55138"/>
+                  <a:pt x="3116007" y="27432"/>
+                </a:cubicBezTo>
+                <a:cubicBezTo>
+                  <a:pt x="2962111" y="-274"/>
+                  <a:pt x="2744280" y="32368"/>
+                  <a:pt x="2509780" y="27432"/>
+                </a:cubicBezTo>
+                <a:cubicBezTo>
+                  <a:pt x="2275280" y="22496"/>
+                  <a:pt x="2066059" y="52808"/>
+                  <a:pt x="1945989" y="27432"/>
+                </a:cubicBezTo>
+                <a:cubicBezTo>
+                  <a:pt x="1825919" y="2056"/>
+                  <a:pt x="1407329" y="21760"/>
+                  <a:pt x="1254890" y="27432"/>
+                </a:cubicBezTo>
+                <a:cubicBezTo>
+                  <a:pt x="1102451" y="33104"/>
+                  <a:pt x="837950" y="40817"/>
+                  <a:pt x="563791" y="27432"/>
+                </a:cubicBezTo>
+                <a:cubicBezTo>
+                  <a:pt x="289632" y="14047"/>
+                  <a:pt x="132768" y="16249"/>
+                  <a:pt x="0" y="27432"/>
+                </a:cubicBezTo>
+                <a:cubicBezTo>
+                  <a:pt x="211" y="18145"/>
+                  <a:pt x="120" y="6480"/>
+                  <a:pt x="0" y="0"/>
+                </a:cubicBezTo>
+                <a:close/>
+              </a:path>
+            </a:pathLst>
+          </a:custGeom>
+          <a:solidFill>
+            <a:schemeClr val="accent1"/>
+          </a:solidFill>
+          <a:ln w="38100" cap="rnd">
+            <a:solidFill>
+              <a:schemeClr val="accent1"/>
+            </a:solidFill>
+            <a:round/>
+            <a:extLst>
+              <a:ext uri="{C807C97D-BFC1-408E-A445-0C87EB9F89A2}">
+                <ask:lineSketchStyleProps xmlns:ask="http://schemas.microsoft.com/office/drawing/2018/sketchyshapes" sd="1219033472">
+                  <a:prstGeom prst="rect">
+                    <a:avLst/>
+                  </a:prstGeom>
+                  <ask:type>
+                    <ask:lineSketchFreehand/>
+                  </ask:type>
+                </ask:lineSketchStyleProps>
+              </a:ext>
+            </a:extLst>
+          </a:ln>
+        </p:spPr>
+        <p:style>
+          <a:lnRef idx="2">
+            <a:schemeClr val="accent1">
+              <a:shade val="50000"/>
+            </a:schemeClr>
+          </a:lnRef>
+          <a:fillRef idx="1">
+            <a:schemeClr val="accent1"/>
+          </a:fillRef>
+          <a:effectRef idx="0">
+            <a:schemeClr val="accent1"/>
+          </a:effectRef>
+          <a:fontRef idx="minor">
+            <a:schemeClr val="lt1"/>
+          </a:fontRef>
+        </p:style>
+        <p:txBody>
+          <a:bodyPr rtlCol="0" anchor="ctr"/>
+          <a:lstStyle/>
+          <a:p>
+            <a:pPr algn="ctr"/>
+            <a:endParaRPr lang="en-US"/>
+          </a:p>
+        </p:txBody>
+      </p:sp>
+      <p:sp>
+        <p:nvSpPr>
+          <p:cNvPr id="3" name="Content Placeholder 2">
+            <a:extLst>
+              <a:ext uri="{FF2B5EF4-FFF2-40B4-BE49-F238E27FC236}">
+                <a16:creationId xmlns:a16="http://schemas.microsoft.com/office/drawing/2014/main" id="{EF8B6F65-2A6F-42C3-B8D8-31896C394E47}"/>
+              </a:ext>
+            </a:extLst>
+          </p:cNvPr>
+          <p:cNvSpPr>
+            <a:spLocks noGrp="1"/>
+          </p:cNvSpPr>
+          <p:nvPr>
+            <p:ph idx="1"/>
+          </p:nvPr>
+        </p:nvSpPr>
+        <p:spPr>
+          <a:xfrm>
+            <a:off x="5297762" y="2706624"/>
+            <a:ext cx="6251110" cy="3483864"/>
+          </a:xfrm>
+        </p:spPr>
+        <p:txBody>
+          <a:bodyPr>
+            <a:normAutofit/>
+          </a:bodyPr>
+          <a:lstStyle/>
+          <a:p>
+            <a:endParaRPr lang="en-US"/>
+          </a:p>
+        </p:txBody>
+      </p:sp>
+      <p:pic>
+        <p:nvPicPr>
+          <p:cNvPr id="5" name="Picture 4">
+            <a:extLst>
+              <a:ext uri="{FF2B5EF4-FFF2-40B4-BE49-F238E27FC236}">
+                <a16:creationId xmlns:a16="http://schemas.microsoft.com/office/drawing/2014/main" id="{2E3BBD6E-E0FA-434A-8C9A-A141AA369CA9}"/>
+              </a:ext>
+            </a:extLst>
+          </p:cNvPr>
+          <p:cNvPicPr>
+            <a:picLocks noChangeAspect="1"/>
+          </p:cNvPicPr>
+          <p:nvPr/>
+        </p:nvPicPr>
+        <p:blipFill rotWithShape="1">
+          <a:blip r:embed="rId2"/>
+          <a:srcRect l="26109" r="28560" b="-1"/>
+          <a:stretch/>
+        </p:blipFill>
+        <p:spPr>
+          <a:xfrm>
+            <a:off x="1" y="10"/>
+            <a:ext cx="4657344" cy="6857990"/>
+          </a:xfrm>
+          <a:custGeom>
+            <a:avLst/>
+            <a:gdLst/>
+            <a:ahLst/>
+            <a:cxnLst/>
+            <a:rect l="l" t="t" r="r" b="b"/>
+            <a:pathLst>
+              <a:path w="4657344" h="6858000">
+                <a:moveTo>
+                  <a:pt x="0" y="0"/>
+                </a:moveTo>
+                <a:lnTo>
+                  <a:pt x="3429755" y="0"/>
+                </a:lnTo>
+                <a:lnTo>
+                  <a:pt x="3526016" y="148742"/>
+                </a:lnTo>
+                <a:cubicBezTo>
+                  <a:pt x="3657740" y="365513"/>
+                  <a:pt x="3777402" y="589569"/>
+                  <a:pt x="3886489" y="819975"/>
+                </a:cubicBezTo>
+                <a:cubicBezTo>
+                  <a:pt x="3891856" y="833492"/>
+                  <a:pt x="3900663" y="845393"/>
+                  <a:pt x="3912049" y="854514"/>
+                </a:cubicBezTo>
+                <a:cubicBezTo>
+                  <a:pt x="3897352" y="819849"/>
+                  <a:pt x="3883037" y="784928"/>
+                  <a:pt x="3868083" y="750263"/>
+                </a:cubicBezTo>
+                <a:cubicBezTo>
+                  <a:pt x="3806989" y="608712"/>
+                  <a:pt x="3742478" y="469145"/>
+                  <a:pt x="3674155" y="331786"/>
+                </a:cubicBezTo>
+                <a:lnTo>
+                  <a:pt x="3496656" y="0"/>
+                </a:lnTo>
+                <a:lnTo>
+                  <a:pt x="3554371" y="0"/>
+                </a:lnTo>
+                <a:lnTo>
+                  <a:pt x="3661621" y="196614"/>
+                </a:lnTo>
+                <a:cubicBezTo>
+                  <a:pt x="3856899" y="573253"/>
+                  <a:pt x="4021071" y="966066"/>
+                  <a:pt x="4161279" y="1371196"/>
+                </a:cubicBezTo>
+                <a:cubicBezTo>
+                  <a:pt x="4379525" y="2007265"/>
+                  <a:pt x="4530141" y="2664286"/>
+                  <a:pt x="4610660" y="3331516"/>
+                </a:cubicBezTo>
+                <a:cubicBezTo>
+                  <a:pt x="4652837" y="3672965"/>
+                  <a:pt x="4671625" y="4013908"/>
+                  <a:pt x="4645040" y="4357388"/>
+                </a:cubicBezTo>
+                <a:cubicBezTo>
+                  <a:pt x="4613599" y="4758899"/>
+                  <a:pt x="4566181" y="5157998"/>
+                  <a:pt x="4485789" y="5552906"/>
+                </a:cubicBezTo>
+                <a:cubicBezTo>
+                  <a:pt x="4397121" y="5988893"/>
+                  <a:pt x="4276748" y="6414594"/>
+                  <a:pt x="4117769" y="6828295"/>
+                </a:cubicBezTo>
+                <a:lnTo>
+                  <a:pt x="4105288" y="6858000"/>
+                </a:lnTo>
+                <a:lnTo>
+                  <a:pt x="4052520" y="6858000"/>
+                </a:lnTo>
+                <a:lnTo>
+                  <a:pt x="4059369" y="6841549"/>
+                </a:lnTo>
+                <a:cubicBezTo>
+                  <a:pt x="4147276" y="6614016"/>
+                  <a:pt x="4224193" y="6380817"/>
+                  <a:pt x="4291518" y="6142729"/>
+                </a:cubicBezTo>
+                <a:cubicBezTo>
+                  <a:pt x="4350055" y="5935370"/>
+                  <a:pt x="4393256" y="5723695"/>
+                  <a:pt x="4443357" y="5513923"/>
+                </a:cubicBezTo>
+                <a:cubicBezTo>
+                  <a:pt x="4444541" y="5502788"/>
+                  <a:pt x="4445137" y="5491601"/>
+                  <a:pt x="4445146" y="5480401"/>
+                </a:cubicBezTo>
+                <a:cubicBezTo>
+                  <a:pt x="4408465" y="5607635"/>
+                  <a:pt x="4379196" y="5719759"/>
+                  <a:pt x="4344559" y="5830359"/>
+                </a:cubicBezTo>
+                <a:cubicBezTo>
+                  <a:pt x="4254261" y="6118381"/>
+                  <a:pt x="4150112" y="6398531"/>
+                  <a:pt x="4031702" y="6670527"/>
+                </a:cubicBezTo>
+                <a:lnTo>
+                  <a:pt x="3943824" y="6858000"/>
+                </a:lnTo>
+                <a:lnTo>
+                  <a:pt x="0" y="6858000"/>
+                </a:lnTo>
+                <a:close/>
+              </a:path>
+            </a:pathLst>
+          </a:custGeom>
+        </p:spPr>
+      </p:pic>
+    </p:spTree>
+    <p:extLst>
+      <p:ext uri="{BB962C8B-B14F-4D97-AF65-F5344CB8AC3E}">
+        <p14:creationId xmlns:p14="http://schemas.microsoft.com/office/powerpoint/2010/main" val="1605746849"/>
+      </p:ext>
+    </p:extLst>
+  </p:cSld>
+  <p:clrMapOvr>
+    <a:masterClrMapping/>
+  </p:clrMapOvr>
+</p:sld>
+</file>
+
+<file path=ppt/slides/slide7.xml><?xml version="1.0" encoding="utf-8"?>
+<p:sld xmlns:a="http://schemas.openxmlformats.org/drawingml/2006/main" xmlns:r="http://schemas.openxmlformats.org/officeDocument/2006/relationships" xmlns:p="http://schemas.openxmlformats.org/presentationml/2006/main">
+  <p:cSld>
+    <p:spTree>
+      <p:nvGrpSpPr>
+        <p:cNvPr id="1" name=""/>
+        <p:cNvGrpSpPr/>
+        <p:nvPr/>
+      </p:nvGrpSpPr>
+      <p:grpSpPr>
+        <a:xfrm>
+          <a:off x="0" y="0"/>
+          <a:ext cx="0" cy="0"/>
+          <a:chOff x="0" y="0"/>
+          <a:chExt cx="0" cy="0"/>
+        </a:xfrm>
+      </p:grpSpPr>
+      <p:sp>
+        <p:nvSpPr>
+          <p:cNvPr id="2" name="Title 1">
+            <a:extLst>
+              <a:ext uri="{FF2B5EF4-FFF2-40B4-BE49-F238E27FC236}">
+                <a16:creationId xmlns:a16="http://schemas.microsoft.com/office/drawing/2014/main" id="{540CDC84-4EE6-4E14-90C4-56266BC3456A}"/>
+              </a:ext>
+            </a:extLst>
+          </p:cNvPr>
+          <p:cNvSpPr>
+            <a:spLocks noGrp="1"/>
+          </p:cNvSpPr>
+          <p:nvPr>
+            <p:ph type="title"/>
+          </p:nvPr>
+        </p:nvSpPr>
+        <p:spPr/>
+        <p:txBody>
+          <a:bodyPr/>
+          <a:lstStyle/>
+          <a:p>
+            <a:r>
+              <a:rPr lang="en-US" dirty="0"/>
+              <a:t>Thank you</a:t>
+            </a:r>
+          </a:p>
+        </p:txBody>
+      </p:sp>
+      <p:sp>
+        <p:nvSpPr>
+          <p:cNvPr id="3" name="Content Placeholder 2">
+            <a:extLst>
+              <a:ext uri="{FF2B5EF4-FFF2-40B4-BE49-F238E27FC236}">
+                <a16:creationId xmlns:a16="http://schemas.microsoft.com/office/drawing/2014/main" id="{97307E69-7978-4938-A6C3-EDEE05AD32A7}"/>
+              </a:ext>
+            </a:extLst>
+          </p:cNvPr>
+          <p:cNvSpPr>
+            <a:spLocks noGrp="1"/>
+          </p:cNvSpPr>
+          <p:nvPr>
+            <p:ph idx="1"/>
+          </p:nvPr>
+        </p:nvSpPr>
+        <p:spPr/>
+        <p:txBody>
+          <a:bodyPr/>
+          <a:lstStyle/>
+          <a:p>
+            <a:endParaRPr lang="en-US"/>
+          </a:p>
+        </p:txBody>
+      </p:sp>
+    </p:spTree>
+    <p:extLst>
+      <p:ext uri="{BB962C8B-B14F-4D97-AF65-F5344CB8AC3E}">
+        <p14:creationId xmlns:p14="http://schemas.microsoft.com/office/powerpoint/2010/main" val="3302558011"/>
       </p:ext>
     </p:extLst>
   </p:cSld>

</xml_diff>